<commit_message>
New changes- semi final
</commit_message>
<xml_diff>
--- a/powerpoint.pptx
+++ b/powerpoint.pptx
@@ -20,6 +20,13 @@
     <p:sldId id="268" r:id="rId14"/>
     <p:sldId id="269" r:id="rId15"/>
     <p:sldId id="270" r:id="rId16"/>
+    <p:sldId id="271" r:id="rId17"/>
+    <p:sldId id="272" r:id="rId18"/>
+    <p:sldId id="273" r:id="rId19"/>
+    <p:sldId id="274" r:id="rId20"/>
+    <p:sldId id="275" r:id="rId21"/>
+    <p:sldId id="276" r:id="rId22"/>
+    <p:sldId id="277" r:id="rId23"/>
   </p:sldIdLst>
   <p:sldSz cx="9144000" cy="5143500" type="screen16x9"/>
   <p:notesSz cx="6858000" cy="9144000"/>
@@ -3129,7 +3136,7 @@
             </a:pPr>
             <a:r>
               <a:rPr/>
-              <a:t>Confirmatory Factor Analysis using Lavaan of UTAUT2 Survey Data to assess construct validity and model fit</a:t>
+              <a:t>Comparing two different UTAUT models and factor loadings</a:t>
             </a:r>
           </a:p>
         </p:txBody>
@@ -3186,7 +3193,7 @@
             </a:pPr>
             <a:r>
               <a:rPr/>
-              <a:t>2023-05-08</a:t>
+              <a:t>2023-05-01</a:t>
             </a:r>
           </a:p>
         </p:txBody>
@@ -3233,7 +3240,7 @@
             </a:pPr>
             <a:r>
               <a:rPr/>
-              <a:t>R Markdown</a:t>
+              <a:t>Analysis</a:t>
             </a:r>
           </a:p>
         </p:txBody>
@@ -3258,34 +3265,16 @@
             </a:pPr>
             <a:r>
               <a:rPr/>
-              <a:t>This is an R Markdown presentation. Markdown is a simple formatting syntax for authoring HTML, PDF, and MS Word documents. For more details on using R Markdown see </a:t>
-            </a:r>
-            <a:r>
-              <a:rPr>
-                <a:hlinkClick r:id="rId2"/>
-              </a:rPr>
-              <a:t>http://rmarkdown.rstudio.com</a:t>
-            </a:r>
+              <a:t>The comparative fit index (CFI) and Tucker-Lewis Index (TLI) both have values less than 0.70, which is an indicator of a poor model fit. The root mean square error of approximation (RMSEA) of 0.109 with a 90% confidence interval between 0.104 and 0.114 suggests that the model fit is not very good. The standardized root mean square residual (SRMR) of 0.125 is also an indicator of a relatively poor model fit.</a:t>
+            </a:r>
+          </a:p>
+          <a:p>
+            <a:pPr lvl="0" indent="0" marL="0">
+              <a:buNone/>
+            </a:pPr>
             <a:r>
               <a:rPr/>
-              <a:t>.</a:t>
-            </a:r>
-          </a:p>
-          <a:p>
-            <a:pPr lvl="0" indent="0" marL="0">
-              <a:buNone/>
-            </a:pPr>
-            <a:r>
-              <a:rPr/>
-              <a:t>When you click the </a:t>
-            </a:r>
-            <a:r>
-              <a:rPr b="1"/>
-              <a:t>Knit</a:t>
-            </a:r>
-            <a:r>
-              <a:rPr/>
-              <a:t> button a document will be generated that includes both content as well as the output of any embedded R code chunks within the document.</a:t>
+              <a:t>In summary, the overall fit of the model is poor, as indicated by the significant chi-square test statistic, low CFI and TLI values, high RMSEA, and high SRMR.</a:t>
             </a:r>
           </a:p>
         </p:txBody>
@@ -3322,6 +3311,36 @@
             <p:ph type="title"/>
           </p:nvPr>
         </p:nvSpPr>
+        <p:spPr>
+          <a:xfrm>
+            <a:off x="457201" y="204787"/>
+            <a:ext cx="3008313" cy="871538"/>
+          </a:xfrm>
+        </p:spPr>
+        <p:txBody>
+          <a:bodyPr/>
+          <a:lstStyle/>
+          <a:p>
+            <a:pPr lvl="0" indent="0" marL="0">
+              <a:buNone/>
+            </a:pPr>
+            <a:r>
+              <a:rPr/>
+              <a:t>SEM Path Diagram</a:t>
+            </a:r>
+          </a:p>
+        </p:txBody>
+      </p:sp>
+      <p:sp>
+        <p:nvSpPr>
+          <p:cNvPr id="4" name="Text Placeholder 3"/>
+          <p:cNvSpPr>
+            <a:spLocks noGrp="1"/>
+          </p:cNvSpPr>
+          <p:nvPr>
+            <p:ph idx="2" sz="half" type="body"/>
+          </p:nvPr>
+        </p:nvSpPr>
         <p:spPr/>
         <p:txBody>
           <a:bodyPr/>
@@ -3332,63 +3351,41 @@
             </a:pPr>
             <a:r>
               <a:rPr/>
-              <a:t>R Markdown</a:t>
-            </a:r>
-          </a:p>
-        </p:txBody>
-      </p:sp>
-      <p:sp>
-        <p:nvSpPr>
-          <p:cNvPr id="3" name="Content Placeholder 2"/>
-          <p:cNvSpPr>
-            <a:spLocks noGrp="1"/>
-          </p:cNvSpPr>
-          <p:nvPr>
-            <p:ph idx="1"/>
-          </p:nvPr>
-        </p:nvSpPr>
-        <p:spPr/>
-        <p:txBody>
-          <a:bodyPr/>
-          <a:lstStyle/>
-          <a:p>
-            <a:pPr lvl="0" indent="0" marL="0">
-              <a:buNone/>
-            </a:pPr>
-            <a:r>
-              <a:rPr/>
-              <a:t>This is an R Markdown presentation. Markdown is a simple formatting syntax for authoring HTML, PDF, and MS Word documents. For more details on using R Markdown see </a:t>
-            </a:r>
-            <a:r>
-              <a:rPr>
-                <a:hlinkClick r:id="rId2"/>
-              </a:rPr>
-              <a:t>http://rmarkdown.rstudio.com</a:t>
-            </a:r>
-            <a:r>
-              <a:rPr/>
-              <a:t>.</a:t>
-            </a:r>
-          </a:p>
-          <a:p>
-            <a:pPr lvl="0" indent="0" marL="0">
-              <a:buNone/>
-            </a:pPr>
-            <a:r>
-              <a:rPr/>
-              <a:t>When you click the </a:t>
-            </a:r>
-            <a:r>
-              <a:rPr b="1"/>
-              <a:t>Knit</a:t>
-            </a:r>
-            <a:r>
-              <a:rPr/>
-              <a:t> button a document will be generated that includes both content as well as the output of any embedded R code chunks within the document.</a:t>
-            </a:r>
-          </a:p>
-        </p:txBody>
-      </p:sp>
+              <a:t>The path diagram was built using lavaanplot ((Lishinski 2021)</a:t>
+            </a:r>
+          </a:p>
+        </p:txBody>
+      </p:sp>
+      <p:pic>
+        <p:nvPicPr>
+          <p:cNvPr descr="Rplot06.png" id="0" name="Picture 1"/>
+          <p:cNvPicPr>
+            <a:picLocks noGrp="1" noChangeAspect="1"/>
+          </p:cNvPicPr>
+          <p:nvPr/>
+        </p:nvPicPr>
+        <p:blipFill>
+          <a:blip r:embed="rId2"/>
+          <a:stretch>
+            <a:fillRect/>
+          </a:stretch>
+        </p:blipFill>
+        <p:spPr bwMode="auto">
+          <a:xfrm>
+            <a:off x="3568700" y="1206500"/>
+            <a:ext cx="5105400" cy="2374900"/>
+          </a:xfrm>
+          <a:prstGeom prst="rect">
+            <a:avLst/>
+          </a:prstGeom>
+          <a:noFill/>
+          <a:ln w="9525">
+            <a:noFill/>
+            <a:headEnd/>
+            <a:tailEnd/>
+          </a:ln>
+        </p:spPr>
+      </p:pic>
     </p:spTree>
   </p:cSld>
 </p:sld>
@@ -3431,7 +3428,7 @@
             </a:pPr>
             <a:r>
               <a:rPr/>
-              <a:t>R Markdown</a:t>
+              <a:t>Factor Loadings</a:t>
             </a:r>
           </a:p>
         </p:txBody>
@@ -3456,34 +3453,7 @@
             </a:pPr>
             <a:r>
               <a:rPr/>
-              <a:t>This is an R Markdown presentation. Markdown is a simple formatting syntax for authoring HTML, PDF, and MS Word documents. For more details on using R Markdown see </a:t>
-            </a:r>
-            <a:r>
-              <a:rPr>
-                <a:hlinkClick r:id="rId2"/>
-              </a:rPr>
-              <a:t>http://rmarkdown.rstudio.com</a:t>
-            </a:r>
-            <a:r>
-              <a:rPr/>
-              <a:t>.</a:t>
-            </a:r>
-          </a:p>
-          <a:p>
-            <a:pPr lvl="0" indent="0" marL="0">
-              <a:buNone/>
-            </a:pPr>
-            <a:r>
-              <a:rPr/>
-              <a:t>When you click the </a:t>
-            </a:r>
-            <a:r>
-              <a:rPr b="1"/>
-              <a:t>Knit</a:t>
-            </a:r>
-            <a:r>
-              <a:rPr/>
-              <a:t> button a document will be generated that includes both content as well as the output of any embedded R code chunks within the document.</a:t>
+              <a:t>We can see that the factor loadings for most of the observed variables are above 0.5, indicating a good fit between the observed variables and their corresponding latent variables. The standardized factor loadings for the EF and SI latent variables are relatively low, but still above 0.3.</a:t>
             </a:r>
           </a:p>
         </p:txBody>
@@ -3520,6 +3490,36 @@
             <p:ph type="title"/>
           </p:nvPr>
         </p:nvSpPr>
+        <p:spPr>
+          <a:xfrm>
+            <a:off x="457201" y="204787"/>
+            <a:ext cx="3008313" cy="871538"/>
+          </a:xfrm>
+        </p:spPr>
+        <p:txBody>
+          <a:bodyPr/>
+          <a:lstStyle/>
+          <a:p>
+            <a:pPr lvl="0" indent="0" marL="0">
+              <a:buNone/>
+            </a:pPr>
+            <a:r>
+              <a:rPr/>
+              <a:t>Alternative Model</a:t>
+            </a:r>
+          </a:p>
+        </p:txBody>
+      </p:sp>
+      <p:sp>
+        <p:nvSpPr>
+          <p:cNvPr id="4" name="Text Placeholder 3"/>
+          <p:cNvSpPr>
+            <a:spLocks noGrp="1"/>
+          </p:cNvSpPr>
+          <p:nvPr>
+            <p:ph idx="2" sz="half" type="body"/>
+          </p:nvPr>
+        </p:nvSpPr>
         <p:spPr/>
         <p:txBody>
           <a:bodyPr/>
@@ -3530,48 +3530,41 @@
             </a:pPr>
             <a:r>
               <a:rPr/>
-              <a:t>Slide with Bullets</a:t>
-            </a:r>
-          </a:p>
-        </p:txBody>
-      </p:sp>
-      <p:sp>
-        <p:nvSpPr>
-          <p:cNvPr id="3" name="Content Placeholder 2"/>
-          <p:cNvSpPr>
-            <a:spLocks noGrp="1"/>
-          </p:cNvSpPr>
-          <p:nvPr>
-            <p:ph idx="1"/>
-          </p:nvPr>
-        </p:nvSpPr>
-        <p:spPr/>
-        <p:txBody>
-          <a:bodyPr/>
-          <a:lstStyle/>
-          <a:p>
-            <a:pPr lvl="0"/>
-            <a:r>
-              <a:rPr/>
-              <a:t>Bullet 1</a:t>
-            </a:r>
-          </a:p>
-          <a:p>
-            <a:pPr lvl="0"/>
-            <a:r>
-              <a:rPr/>
-              <a:t>Bullet 2</a:t>
-            </a:r>
-          </a:p>
-          <a:p>
-            <a:pPr lvl="0"/>
-            <a:r>
-              <a:rPr/>
-              <a:t>Bullet 3</a:t>
-            </a:r>
-          </a:p>
-        </p:txBody>
-      </p:sp>
+              <a:t>I wanted to test an alternative model where all the latent variables are correlated to the intention to use but not to use behavior. All the latent variables are mediated by intention to use.</a:t>
+            </a:r>
+          </a:p>
+        </p:txBody>
+      </p:sp>
+      <p:pic>
+        <p:nvPicPr>
+          <p:cNvPr descr="model2.png" id="0" name="Picture 1"/>
+          <p:cNvPicPr>
+            <a:picLocks noGrp="1" noChangeAspect="1"/>
+          </p:cNvPicPr>
+          <p:nvPr/>
+        </p:nvPicPr>
+        <p:blipFill>
+          <a:blip r:embed="rId2"/>
+          <a:stretch>
+            <a:fillRect/>
+          </a:stretch>
+        </p:blipFill>
+        <p:spPr bwMode="auto">
+          <a:xfrm>
+            <a:off x="3568700" y="850900"/>
+            <a:ext cx="5105400" cy="3086100"/>
+          </a:xfrm>
+          <a:prstGeom prst="rect">
+            <a:avLst/>
+          </a:prstGeom>
+          <a:noFill/>
+          <a:ln w="9525">
+            <a:noFill/>
+            <a:headEnd/>
+            <a:tailEnd/>
+          </a:ln>
+        </p:spPr>
+      </p:pic>
     </p:spTree>
   </p:cSld>
 </p:sld>
@@ -3614,7 +3607,7 @@
             </a:pPr>
             <a:r>
               <a:rPr/>
-              <a:t>Slide with R Output</a:t>
+              <a:t>Testing the Modified Model</a:t>
             </a:r>
           </a:p>
         </p:txBody>
@@ -3634,40 +3627,371 @@
           <a:bodyPr/>
           <a:lstStyle/>
           <a:p>
+            <a:pPr lvl="0" indent="0" marL="0">
+              <a:buNone/>
+            </a:pPr>
+            <a:r>
+              <a:rPr/>
+              <a:t>I tested the UTAUT research model using lavaan :</a:t>
+            </a:r>
+          </a:p>
+          <a:p>
             <a:pPr lvl="0" indent="0">
               <a:buNone/>
             </a:pPr>
             <a:r>
+              <a:rPr i="1">
+                <a:solidFill>
+                  <a:srgbClr val="60A0B0"/>
+                </a:solidFill>
+                <a:latin typeface="Courier"/>
+              </a:rPr>
+              <a:t># Specify the model</a:t>
+            </a:r>
+            <a:br/>
+            <a:r>
+              <a:rPr>
+                <a:latin typeface="Courier"/>
+              </a:rPr>
+              <a:t>model2 </a:t>
+            </a:r>
+            <a:r>
+              <a:rPr>
+                <a:solidFill>
+                  <a:srgbClr val="007020"/>
+                </a:solidFill>
+                <a:latin typeface="Courier"/>
+              </a:rPr>
+              <a:t>&lt;-</a:t>
+            </a:r>
+            <a:r>
+              <a:rPr>
+                <a:latin typeface="Courier"/>
+              </a:rPr>
+              <a:t> </a:t>
+            </a:r>
+            <a:r>
+              <a:rPr>
+                <a:solidFill>
+                  <a:srgbClr val="4070A0"/>
+                </a:solidFill>
+                <a:latin typeface="Courier"/>
+              </a:rPr>
+              <a:t>'</a:t>
+            </a:r>
+            <a:br/>
+            <a:r>
+              <a:rPr>
+                <a:solidFill>
+                  <a:srgbClr val="4070A0"/>
+                </a:solidFill>
+                <a:latin typeface="Courier"/>
+              </a:rPr>
+              <a:t>   # UTAUT2 Measurement Model</a:t>
+            </a:r>
+            <a:br/>
+            <a:r>
+              <a:rPr>
+                <a:solidFill>
+                  <a:srgbClr val="4070A0"/>
+                </a:solidFill>
+                <a:latin typeface="Courier"/>
+              </a:rPr>
+              <a:t>  </a:t>
+            </a:r>
+            <a:br/>
+            <a:r>
+              <a:rPr>
+                <a:solidFill>
+                  <a:srgbClr val="4070A0"/>
+                </a:solidFill>
+                <a:latin typeface="Courier"/>
+              </a:rPr>
+              <a:t>   PE =~ PE1+PE2+PE3+PE4+PE5</a:t>
+            </a:r>
+            <a:br/>
+            <a:r>
+              <a:rPr>
+                <a:solidFill>
+                  <a:srgbClr val="4070A0"/>
+                </a:solidFill>
+                <a:latin typeface="Courier"/>
+              </a:rPr>
+              <a:t>   EF =~ EF1+EF2+EF3+EF4</a:t>
+            </a:r>
+            <a:br/>
+            <a:r>
+              <a:rPr>
+                <a:solidFill>
+                  <a:srgbClr val="4070A0"/>
+                </a:solidFill>
+                <a:latin typeface="Courier"/>
+              </a:rPr>
+              <a:t>   FC =~ FC1+FC2+FC3+FC4+FC5</a:t>
+            </a:r>
+            <a:br/>
+            <a:r>
+              <a:rPr>
+                <a:solidFill>
+                  <a:srgbClr val="4070A0"/>
+                </a:solidFill>
+                <a:latin typeface="Courier"/>
+              </a:rPr>
+              <a:t>   HM =~ HM1+HM2+HM3+HM4</a:t>
+            </a:r>
+            <a:br/>
+            <a:r>
+              <a:rPr>
+                <a:solidFill>
+                  <a:srgbClr val="4070A0"/>
+                </a:solidFill>
+                <a:latin typeface="Courier"/>
+              </a:rPr>
+              <a:t>   SI =~ SI1+SI2+SI3+SI4</a:t>
+            </a:r>
+            <a:br/>
+            <a:r>
+              <a:rPr>
+                <a:solidFill>
+                  <a:srgbClr val="4070A0"/>
+                </a:solidFill>
+                <a:latin typeface="Courier"/>
+              </a:rPr>
+              <a:t>   HB =~ Habit1+Habit2+Habit3+Habit4 </a:t>
+            </a:r>
+            <a:br/>
+            <a:r>
+              <a:rPr>
+                <a:solidFill>
+                  <a:srgbClr val="4070A0"/>
+                </a:solidFill>
+                <a:latin typeface="Courier"/>
+              </a:rPr>
+              <a:t>   IU =~ ITU1+ITU2+ITU3+ITU4+ITU5+ITU6+ITU7+ITU8+ITU8+ITU9+ITU10+ITU11</a:t>
+            </a:r>
+            <a:br/>
+            <a:r>
+              <a:rPr>
+                <a:solidFill>
+                  <a:srgbClr val="4070A0"/>
+                </a:solidFill>
+                <a:latin typeface="Courier"/>
+              </a:rPr>
+              <a:t>   UB =~ UB1+UB2+UB3+UB4</a:t>
+            </a:r>
+            <a:br/>
+            <a:r>
+              <a:rPr>
+                <a:solidFill>
+                  <a:srgbClr val="4070A0"/>
+                </a:solidFill>
+                <a:latin typeface="Courier"/>
+              </a:rPr>
+              <a:t>  </a:t>
+            </a:r>
+            <a:br/>
+            <a:r>
+              <a:rPr>
+                <a:solidFill>
+                  <a:srgbClr val="4070A0"/>
+                </a:solidFill>
+                <a:latin typeface="Courier"/>
+              </a:rPr>
+              <a:t>  #UTAUT2 Structural Model</a:t>
+            </a:r>
+            <a:br/>
+            <a:r>
+              <a:rPr>
+                <a:solidFill>
+                  <a:srgbClr val="4070A0"/>
+                </a:solidFill>
+                <a:latin typeface="Courier"/>
+              </a:rPr>
+              <a:t>  IU ~ PE+EF+HM+SI</a:t>
+            </a:r>
+            <a:br/>
+            <a:r>
+              <a:rPr>
+                <a:solidFill>
+                  <a:srgbClr val="4070A0"/>
+                </a:solidFill>
+                <a:latin typeface="Courier"/>
+              </a:rPr>
+              <a:t>  UB ~ IU</a:t>
+            </a:r>
+            <a:br/>
+            <a:r>
+              <a:rPr>
+                <a:solidFill>
+                  <a:srgbClr val="4070A0"/>
+                </a:solidFill>
+                <a:latin typeface="Courier"/>
+              </a:rPr>
+              <a:t>'</a:t>
+            </a:r>
+            <a:br/>
+            <a:br/>
+            <a:r>
+              <a:rPr i="1">
+                <a:solidFill>
+                  <a:srgbClr val="60A0B0"/>
+                </a:solidFill>
+                <a:latin typeface="Courier"/>
+              </a:rPr>
+              <a:t># Fitting the model</a:t>
+            </a:r>
+            <a:br/>
+            <a:r>
+              <a:rPr>
+                <a:latin typeface="Courier"/>
+              </a:rPr>
+              <a:t>fit </a:t>
+            </a:r>
+            <a:r>
+              <a:rPr>
+                <a:solidFill>
+                  <a:srgbClr val="007020"/>
+                </a:solidFill>
+                <a:latin typeface="Courier"/>
+              </a:rPr>
+              <a:t>&lt;-</a:t>
+            </a:r>
+            <a:r>
+              <a:rPr>
+                <a:latin typeface="Courier"/>
+              </a:rPr>
+              <a:t> </a:t>
+            </a:r>
+            <a:r>
               <a:rPr>
                 <a:solidFill>
                   <a:srgbClr val="06287E"/>
                 </a:solidFill>
                 <a:latin typeface="Courier"/>
               </a:rPr>
+              <a:t>cfa</a:t>
+            </a:r>
+            <a:r>
+              <a:rPr>
+                <a:latin typeface="Courier"/>
+              </a:rPr>
+              <a:t>(model, </a:t>
+            </a:r>
+            <a:r>
+              <a:rPr>
+                <a:solidFill>
+                  <a:srgbClr val="7D9029"/>
+                </a:solidFill>
+                <a:latin typeface="Courier"/>
+              </a:rPr>
+              <a:t>data =</a:t>
+            </a:r>
+            <a:r>
+              <a:rPr>
+                <a:latin typeface="Courier"/>
+              </a:rPr>
+              <a:t> Raw_data_to_analyze_SEM)</a:t>
+            </a:r>
+            <a:br/>
+            <a:br/>
+            <a:br/>
+            <a:r>
+              <a:rPr i="1">
+                <a:solidFill>
+                  <a:srgbClr val="60A0B0"/>
+                </a:solidFill>
+                <a:latin typeface="Courier"/>
+              </a:rPr>
+              <a:t># Finding the fit summary</a:t>
+            </a:r>
+            <a:br/>
+            <a:br/>
+            <a:r>
+              <a:rPr>
+                <a:solidFill>
+                  <a:srgbClr val="06287E"/>
+                </a:solidFill>
+                <a:latin typeface="Courier"/>
+              </a:rPr>
               <a:t>summary</a:t>
             </a:r>
             <a:r>
               <a:rPr>
                 <a:latin typeface="Courier"/>
               </a:rPr>
-              <a:t>(cars)</a:t>
-            </a:r>
-          </a:p>
-          <a:p>
-            <a:pPr lvl="0" indent="0">
-              <a:buNone/>
-            </a:pPr>
-            <a:r>
-              <a:rPr>
-                <a:latin typeface="Courier"/>
-              </a:rPr>
-              <a:t>##      speed           dist       
-##  Min.   : 4.0   Min.   :  2.00  
-##  1st Qu.:12.0   1st Qu.: 26.00  
-##  Median :15.0   Median : 36.00  
-##  Mean   :15.4   Mean   : 42.98  
-##  3rd Qu.:19.0   3rd Qu.: 56.00  
-##  Max.   :25.0   Max.   :120.00</a:t>
+              <a:t>(fit,</a:t>
+            </a:r>
+            <a:r>
+              <a:rPr>
+                <a:solidFill>
+                  <a:srgbClr val="7D9029"/>
+                </a:solidFill>
+                <a:latin typeface="Courier"/>
+              </a:rPr>
+              <a:t>fit.measures=</a:t>
+            </a:r>
+            <a:r>
+              <a:rPr>
+                <a:solidFill>
+                  <a:srgbClr val="880000"/>
+                </a:solidFill>
+                <a:latin typeface="Courier"/>
+              </a:rPr>
+              <a:t>TRUE</a:t>
+            </a:r>
+            <a:r>
+              <a:rPr>
+                <a:latin typeface="Courier"/>
+              </a:rPr>
+              <a:t>,</a:t>
+            </a:r>
+            <a:r>
+              <a:rPr>
+                <a:solidFill>
+                  <a:srgbClr val="7D9029"/>
+                </a:solidFill>
+                <a:latin typeface="Courier"/>
+              </a:rPr>
+              <a:t>standardized=</a:t>
+            </a:r>
+            <a:r>
+              <a:rPr>
+                <a:solidFill>
+                  <a:srgbClr val="880000"/>
+                </a:solidFill>
+                <a:latin typeface="Courier"/>
+              </a:rPr>
+              <a:t>TRUE</a:t>
+            </a:r>
+            <a:r>
+              <a:rPr>
+                <a:latin typeface="Courier"/>
+              </a:rPr>
+              <a:t>, </a:t>
+            </a:r>
+            <a:r>
+              <a:rPr>
+                <a:solidFill>
+                  <a:srgbClr val="7D9029"/>
+                </a:solidFill>
+                <a:latin typeface="Courier"/>
+              </a:rPr>
+              <a:t>rsquare=</a:t>
+            </a:r>
+            <a:r>
+              <a:rPr>
+                <a:solidFill>
+                  <a:srgbClr val="880000"/>
+                </a:solidFill>
+                <a:latin typeface="Courier"/>
+              </a:rPr>
+              <a:t>TRUE</a:t>
+            </a:r>
+            <a:r>
+              <a:rPr>
+                <a:latin typeface="Courier"/>
+              </a:rPr>
+              <a:t>)</a:t>
             </a:r>
           </a:p>
         </p:txBody>
@@ -3714,14 +4038,1092 @@
             </a:pPr>
             <a:r>
               <a:rPr/>
-              <a:t>Slide with Plot</a:t>
+              <a:t>Fit</a:t>
+            </a:r>
+          </a:p>
+        </p:txBody>
+      </p:sp>
+      <p:sp>
+        <p:nvSpPr>
+          <p:cNvPr id="3" name="Content Placeholder 2"/>
+          <p:cNvSpPr>
+            <a:spLocks noGrp="1"/>
+          </p:cNvSpPr>
+          <p:nvPr>
+            <p:ph idx="1"/>
+          </p:nvPr>
+        </p:nvSpPr>
+        <p:spPr/>
+        <p:txBody>
+          <a:bodyPr/>
+          <a:lstStyle/>
+          <a:p>
+            <a:pPr lvl="0" indent="0">
+              <a:buNone/>
+            </a:pPr>
+            <a:r>
+              <a:rPr>
+                <a:latin typeface="Courier"/>
+              </a:rPr>
+              <a:t>lavaan </a:t>
+            </a:r>
+            <a:r>
+              <a:rPr>
+                <a:solidFill>
+                  <a:srgbClr val="40A070"/>
+                </a:solidFill>
+                <a:latin typeface="Courier"/>
+              </a:rPr>
+              <a:t>0</a:t>
+            </a:r>
+            <a:r>
+              <a:rPr>
+                <a:latin typeface="Courier"/>
+              </a:rPr>
+              <a:t>.</a:t>
+            </a:r>
+            <a:r>
+              <a:rPr>
+                <a:solidFill>
+                  <a:srgbClr val="40A070"/>
+                </a:solidFill>
+                <a:latin typeface="Courier"/>
+              </a:rPr>
+              <a:t>6.15</a:t>
+            </a:r>
+            <a:r>
+              <a:rPr>
+                <a:latin typeface="Courier"/>
+              </a:rPr>
+              <a:t> ended normally after </a:t>
+            </a:r>
+            <a:r>
+              <a:rPr>
+                <a:solidFill>
+                  <a:srgbClr val="40A070"/>
+                </a:solidFill>
+                <a:latin typeface="Courier"/>
+              </a:rPr>
+              <a:t>131</a:t>
+            </a:r>
+            <a:r>
+              <a:rPr>
+                <a:latin typeface="Courier"/>
+              </a:rPr>
+              <a:t> iterations</a:t>
+            </a:r>
+            <a:br/>
+            <a:br/>
+            <a:r>
+              <a:rPr>
+                <a:latin typeface="Courier"/>
+              </a:rPr>
+              <a:t>  Estimator                                         ML</a:t>
+            </a:r>
+            <a:br/>
+            <a:r>
+              <a:rPr>
+                <a:latin typeface="Courier"/>
+              </a:rPr>
+              <a:t>  Optimization method                           NLMINB</a:t>
+            </a:r>
+            <a:br/>
+            <a:r>
+              <a:rPr>
+                <a:latin typeface="Courier"/>
+              </a:rPr>
+              <a:t>  Number of model parameters                       </a:t>
+            </a:r>
+            <a:r>
+              <a:rPr>
+                <a:solidFill>
+                  <a:srgbClr val="40A070"/>
+                </a:solidFill>
+                <a:latin typeface="Courier"/>
+              </a:rPr>
+              <a:t>102</a:t>
+            </a:r>
+            <a:br/>
+            <a:br/>
+            <a:r>
+              <a:rPr>
+                <a:latin typeface="Courier"/>
+              </a:rPr>
+              <a:t>  Number of observations                           </a:t>
+            </a:r>
+            <a:r>
+              <a:rPr>
+                <a:solidFill>
+                  <a:srgbClr val="40A070"/>
+                </a:solidFill>
+                <a:latin typeface="Courier"/>
+              </a:rPr>
+              <a:t>170</a:t>
+            </a:r>
+            <a:br/>
+            <a:br/>
+            <a:r>
+              <a:rPr>
+                <a:latin typeface="Courier"/>
+              </a:rPr>
+              <a:t>Model Test User Model</a:t>
+            </a:r>
+            <a:r>
+              <a:rPr>
+                <a:solidFill>
+                  <a:srgbClr val="4070A0"/>
+                </a:solidFill>
+                <a:latin typeface="Courier"/>
+              </a:rPr>
+              <a:t>:</a:t>
+            </a:r>
+            <a:br/>
+            <a:r>
+              <a:rPr>
+                <a:latin typeface="Courier"/>
+              </a:rPr>
+              <a:t>                                                      </a:t>
+            </a:r>
+            <a:br/>
+            <a:r>
+              <a:rPr>
+                <a:latin typeface="Courier"/>
+              </a:rPr>
+              <a:t>  Test statistic                              </a:t>
+            </a:r>
+            <a:r>
+              <a:rPr>
+                <a:solidFill>
+                  <a:srgbClr val="40A070"/>
+                </a:solidFill>
+                <a:latin typeface="Courier"/>
+              </a:rPr>
+              <a:t>2263.895</a:t>
+            </a:r>
+            <a:br/>
+            <a:r>
+              <a:rPr>
+                <a:latin typeface="Courier"/>
+              </a:rPr>
+              <a:t>  Degrees of freedom                               </a:t>
+            </a:r>
+            <a:r>
+              <a:rPr>
+                <a:solidFill>
+                  <a:srgbClr val="40A070"/>
+                </a:solidFill>
+                <a:latin typeface="Courier"/>
+              </a:rPr>
+              <a:t>759</a:t>
+            </a:r>
+            <a:br/>
+            <a:r>
+              <a:rPr>
+                <a:latin typeface="Courier"/>
+              </a:rPr>
+              <a:t>  P</a:t>
+            </a:r>
+            <a:r>
+              <a:rPr>
+                <a:solidFill>
+                  <a:srgbClr val="4070A0"/>
+                </a:solidFill>
+                <a:latin typeface="Courier"/>
+              </a:rPr>
+              <a:t>-</a:t>
+            </a:r>
+            <a:r>
+              <a:rPr>
+                <a:solidFill>
+                  <a:srgbClr val="06287E"/>
+                </a:solidFill>
+                <a:latin typeface="Courier"/>
+              </a:rPr>
+              <a:t>value</a:t>
+            </a:r>
+            <a:r>
+              <a:rPr>
+                <a:latin typeface="Courier"/>
+              </a:rPr>
+              <a:t> (Chi</a:t>
+            </a:r>
+            <a:r>
+              <a:rPr>
+                <a:solidFill>
+                  <a:srgbClr val="4070A0"/>
+                </a:solidFill>
+                <a:latin typeface="Courier"/>
+              </a:rPr>
+              <a:t>-</a:t>
+            </a:r>
+            <a:r>
+              <a:rPr>
+                <a:latin typeface="Courier"/>
+              </a:rPr>
+              <a:t>square)                           </a:t>
+            </a:r>
+            <a:r>
+              <a:rPr>
+                <a:solidFill>
+                  <a:srgbClr val="40A070"/>
+                </a:solidFill>
+                <a:latin typeface="Courier"/>
+              </a:rPr>
+              <a:t>0.000</a:t>
+            </a:r>
+            <a:br/>
+            <a:br/>
+            <a:r>
+              <a:rPr>
+                <a:latin typeface="Courier"/>
+              </a:rPr>
+              <a:t>Model Test Baseline Model</a:t>
+            </a:r>
+            <a:r>
+              <a:rPr>
+                <a:solidFill>
+                  <a:srgbClr val="4070A0"/>
+                </a:solidFill>
+                <a:latin typeface="Courier"/>
+              </a:rPr>
+              <a:t>:</a:t>
+            </a:r>
+            <a:br/>
+            <a:br/>
+            <a:r>
+              <a:rPr>
+                <a:latin typeface="Courier"/>
+              </a:rPr>
+              <a:t>  Test statistic                              </a:t>
+            </a:r>
+            <a:r>
+              <a:rPr>
+                <a:solidFill>
+                  <a:srgbClr val="40A070"/>
+                </a:solidFill>
+                <a:latin typeface="Courier"/>
+              </a:rPr>
+              <a:t>4906.262</a:t>
+            </a:r>
+            <a:br/>
+            <a:r>
+              <a:rPr>
+                <a:latin typeface="Courier"/>
+              </a:rPr>
+              <a:t>  Degrees of freedom                               </a:t>
+            </a:r>
+            <a:r>
+              <a:rPr>
+                <a:solidFill>
+                  <a:srgbClr val="40A070"/>
+                </a:solidFill>
+                <a:latin typeface="Courier"/>
+              </a:rPr>
+              <a:t>820</a:t>
+            </a:r>
+            <a:br/>
+            <a:r>
+              <a:rPr>
+                <a:latin typeface="Courier"/>
+              </a:rPr>
+              <a:t>  P</a:t>
+            </a:r>
+            <a:r>
+              <a:rPr>
+                <a:solidFill>
+                  <a:srgbClr val="4070A0"/>
+                </a:solidFill>
+                <a:latin typeface="Courier"/>
+              </a:rPr>
+              <a:t>-</a:t>
+            </a:r>
+            <a:r>
+              <a:rPr>
+                <a:latin typeface="Courier"/>
+              </a:rPr>
+              <a:t>value                                        </a:t>
+            </a:r>
+            <a:r>
+              <a:rPr>
+                <a:solidFill>
+                  <a:srgbClr val="40A070"/>
+                </a:solidFill>
+                <a:latin typeface="Courier"/>
+              </a:rPr>
+              <a:t>0.000</a:t>
+            </a:r>
+            <a:br/>
+            <a:br/>
+            <a:r>
+              <a:rPr>
+                <a:latin typeface="Courier"/>
+              </a:rPr>
+              <a:t>User Model versus Baseline Model</a:t>
+            </a:r>
+            <a:r>
+              <a:rPr>
+                <a:solidFill>
+                  <a:srgbClr val="4070A0"/>
+                </a:solidFill>
+                <a:latin typeface="Courier"/>
+              </a:rPr>
+              <a:t>:</a:t>
+            </a:r>
+            <a:br/>
+            <a:br/>
+            <a:r>
+              <a:rPr>
+                <a:latin typeface="Courier"/>
+              </a:rPr>
+              <a:t>  Comparative Fit </a:t>
+            </a:r>
+            <a:r>
+              <a:rPr>
+                <a:solidFill>
+                  <a:srgbClr val="06287E"/>
+                </a:solidFill>
+                <a:latin typeface="Courier"/>
+              </a:rPr>
+              <a:t>Index</a:t>
+            </a:r>
+            <a:r>
+              <a:rPr>
+                <a:latin typeface="Courier"/>
+              </a:rPr>
+              <a:t> (CFI)                    </a:t>
+            </a:r>
+            <a:r>
+              <a:rPr>
+                <a:solidFill>
+                  <a:srgbClr val="40A070"/>
+                </a:solidFill>
+                <a:latin typeface="Courier"/>
+              </a:rPr>
+              <a:t>0.632</a:t>
+            </a:r>
+            <a:br/>
+            <a:r>
+              <a:rPr>
+                <a:latin typeface="Courier"/>
+              </a:rPr>
+              <a:t>  Tucker</a:t>
+            </a:r>
+            <a:r>
+              <a:rPr>
+                <a:solidFill>
+                  <a:srgbClr val="4070A0"/>
+                </a:solidFill>
+                <a:latin typeface="Courier"/>
+              </a:rPr>
+              <a:t>-</a:t>
+            </a:r>
+            <a:r>
+              <a:rPr>
+                <a:latin typeface="Courier"/>
+              </a:rPr>
+              <a:t>Lewis </a:t>
+            </a:r>
+            <a:r>
+              <a:rPr>
+                <a:solidFill>
+                  <a:srgbClr val="06287E"/>
+                </a:solidFill>
+                <a:latin typeface="Courier"/>
+              </a:rPr>
+              <a:t>Index</a:t>
+            </a:r>
+            <a:r>
+              <a:rPr>
+                <a:latin typeface="Courier"/>
+              </a:rPr>
+              <a:t> (TLI)                       </a:t>
+            </a:r>
+            <a:r>
+              <a:rPr>
+                <a:solidFill>
+                  <a:srgbClr val="40A070"/>
+                </a:solidFill>
+                <a:latin typeface="Courier"/>
+              </a:rPr>
+              <a:t>0.602</a:t>
+            </a:r>
+            <a:br/>
+            <a:br/>
+            <a:r>
+              <a:rPr>
+                <a:latin typeface="Courier"/>
+              </a:rPr>
+              <a:t>Loglikelihood and Information Criteria</a:t>
+            </a:r>
+            <a:r>
+              <a:rPr>
+                <a:solidFill>
+                  <a:srgbClr val="4070A0"/>
+                </a:solidFill>
+                <a:latin typeface="Courier"/>
+              </a:rPr>
+              <a:t>:</a:t>
+            </a:r>
+            <a:br/>
+            <a:br/>
+            <a:r>
+              <a:rPr>
+                <a:latin typeface="Courier"/>
+              </a:rPr>
+              <a:t>  Loglikelihood user </a:t>
+            </a:r>
+            <a:r>
+              <a:rPr>
+                <a:solidFill>
+                  <a:srgbClr val="06287E"/>
+                </a:solidFill>
+                <a:latin typeface="Courier"/>
+              </a:rPr>
+              <a:t>model</a:t>
+            </a:r>
+            <a:r>
+              <a:rPr>
+                <a:latin typeface="Courier"/>
+              </a:rPr>
+              <a:t> (H0)              </a:t>
+            </a:r>
+            <a:r>
+              <a:rPr>
+                <a:solidFill>
+                  <a:srgbClr val="4070A0"/>
+                </a:solidFill>
+                <a:latin typeface="Courier"/>
+              </a:rPr>
+              <a:t>-</a:t>
+            </a:r>
+            <a:r>
+              <a:rPr>
+                <a:solidFill>
+                  <a:srgbClr val="40A070"/>
+                </a:solidFill>
+                <a:latin typeface="Courier"/>
+              </a:rPr>
+              <a:t>8046.654</a:t>
+            </a:r>
+            <a:br/>
+            <a:r>
+              <a:rPr>
+                <a:latin typeface="Courier"/>
+              </a:rPr>
+              <a:t>  Loglikelihood unrestricted </a:t>
+            </a:r>
+            <a:r>
+              <a:rPr>
+                <a:solidFill>
+                  <a:srgbClr val="06287E"/>
+                </a:solidFill>
+                <a:latin typeface="Courier"/>
+              </a:rPr>
+              <a:t>model</a:t>
+            </a:r>
+            <a:r>
+              <a:rPr>
+                <a:latin typeface="Courier"/>
+              </a:rPr>
+              <a:t> (H1)      </a:t>
+            </a:r>
+            <a:r>
+              <a:rPr>
+                <a:solidFill>
+                  <a:srgbClr val="4070A0"/>
+                </a:solidFill>
+                <a:latin typeface="Courier"/>
+              </a:rPr>
+              <a:t>-</a:t>
+            </a:r>
+            <a:r>
+              <a:rPr>
+                <a:solidFill>
+                  <a:srgbClr val="40A070"/>
+                </a:solidFill>
+                <a:latin typeface="Courier"/>
+              </a:rPr>
+              <a:t>6914.707</a:t>
+            </a:r>
+            <a:br/>
+            <a:r>
+              <a:rPr>
+                <a:latin typeface="Courier"/>
+              </a:rPr>
+              <a:t>                                                      </a:t>
+            </a:r>
+            <a:br/>
+            <a:r>
+              <a:rPr>
+                <a:latin typeface="Courier"/>
+              </a:rPr>
+              <a:t>  </a:t>
+            </a:r>
+            <a:r>
+              <a:rPr>
+                <a:solidFill>
+                  <a:srgbClr val="06287E"/>
+                </a:solidFill>
+                <a:latin typeface="Courier"/>
+              </a:rPr>
+              <a:t>Akaike</a:t>
+            </a:r>
+            <a:r>
+              <a:rPr>
+                <a:latin typeface="Courier"/>
+              </a:rPr>
+              <a:t> (AIC)                               </a:t>
+            </a:r>
+            <a:r>
+              <a:rPr>
+                <a:solidFill>
+                  <a:srgbClr val="40A070"/>
+                </a:solidFill>
+                <a:latin typeface="Courier"/>
+              </a:rPr>
+              <a:t>16297.309</a:t>
+            </a:r>
+            <a:br/>
+            <a:r>
+              <a:rPr>
+                <a:latin typeface="Courier"/>
+              </a:rPr>
+              <a:t>  </a:t>
+            </a:r>
+            <a:r>
+              <a:rPr>
+                <a:solidFill>
+                  <a:srgbClr val="06287E"/>
+                </a:solidFill>
+                <a:latin typeface="Courier"/>
+              </a:rPr>
+              <a:t>Bayesian</a:t>
+            </a:r>
+            <a:r>
+              <a:rPr>
+                <a:latin typeface="Courier"/>
+              </a:rPr>
+              <a:t> (BIC)                             </a:t>
+            </a:r>
+            <a:r>
+              <a:rPr>
+                <a:solidFill>
+                  <a:srgbClr val="40A070"/>
+                </a:solidFill>
+                <a:latin typeface="Courier"/>
+              </a:rPr>
+              <a:t>16617.160</a:t>
+            </a:r>
+            <a:br/>
+            <a:r>
+              <a:rPr>
+                <a:latin typeface="Courier"/>
+              </a:rPr>
+              <a:t>  Sample</a:t>
+            </a:r>
+            <a:r>
+              <a:rPr>
+                <a:solidFill>
+                  <a:srgbClr val="4070A0"/>
+                </a:solidFill>
+                <a:latin typeface="Courier"/>
+              </a:rPr>
+              <a:t>-</a:t>
+            </a:r>
+            <a:r>
+              <a:rPr>
+                <a:latin typeface="Courier"/>
+              </a:rPr>
+              <a:t>size adjusted </a:t>
+            </a:r>
+            <a:r>
+              <a:rPr>
+                <a:solidFill>
+                  <a:srgbClr val="06287E"/>
+                </a:solidFill>
+                <a:latin typeface="Courier"/>
+              </a:rPr>
+              <a:t>Bayesian</a:t>
+            </a:r>
+            <a:r>
+              <a:rPr>
+                <a:latin typeface="Courier"/>
+              </a:rPr>
+              <a:t> (SABIC)      </a:t>
+            </a:r>
+            <a:r>
+              <a:rPr>
+                <a:solidFill>
+                  <a:srgbClr val="40A070"/>
+                </a:solidFill>
+                <a:latin typeface="Courier"/>
+              </a:rPr>
+              <a:t>16294.192</a:t>
+            </a:r>
+            <a:br/>
+            <a:br/>
+            <a:r>
+              <a:rPr>
+                <a:latin typeface="Courier"/>
+              </a:rPr>
+              <a:t>Root Mean Square Error of Approximation</a:t>
+            </a:r>
+            <a:r>
+              <a:rPr>
+                <a:solidFill>
+                  <a:srgbClr val="4070A0"/>
+                </a:solidFill>
+                <a:latin typeface="Courier"/>
+              </a:rPr>
+              <a:t>:</a:t>
+            </a:r>
+            <a:br/>
+            <a:br/>
+            <a:r>
+              <a:rPr>
+                <a:latin typeface="Courier"/>
+              </a:rPr>
+              <a:t>  RMSEA                                          </a:t>
+            </a:r>
+            <a:r>
+              <a:rPr>
+                <a:solidFill>
+                  <a:srgbClr val="40A070"/>
+                </a:solidFill>
+                <a:latin typeface="Courier"/>
+              </a:rPr>
+              <a:t>0.108</a:t>
+            </a:r>
+            <a:br/>
+            <a:r>
+              <a:rPr>
+                <a:latin typeface="Courier"/>
+              </a:rPr>
+              <a:t>  </a:t>
+            </a:r>
+            <a:r>
+              <a:rPr>
+                <a:solidFill>
+                  <a:srgbClr val="40A070"/>
+                </a:solidFill>
+                <a:latin typeface="Courier"/>
+              </a:rPr>
+              <a:t>90</a:t>
+            </a:r>
+            <a:r>
+              <a:rPr>
+                <a:latin typeface="Courier"/>
+              </a:rPr>
+              <a:t> Percent confidence interval </a:t>
+            </a:r>
+            <a:r>
+              <a:rPr>
+                <a:solidFill>
+                  <a:srgbClr val="4070A0"/>
+                </a:solidFill>
+                <a:latin typeface="Courier"/>
+              </a:rPr>
+              <a:t>-</a:t>
+            </a:r>
+            <a:r>
+              <a:rPr>
+                <a:latin typeface="Courier"/>
+              </a:rPr>
+              <a:t> lower         </a:t>
+            </a:r>
+            <a:r>
+              <a:rPr>
+                <a:solidFill>
+                  <a:srgbClr val="40A070"/>
+                </a:solidFill>
+                <a:latin typeface="Courier"/>
+              </a:rPr>
+              <a:t>0.103</a:t>
+            </a:r>
+            <a:br/>
+            <a:r>
+              <a:rPr>
+                <a:latin typeface="Courier"/>
+              </a:rPr>
+              <a:t>  </a:t>
+            </a:r>
+            <a:r>
+              <a:rPr>
+                <a:solidFill>
+                  <a:srgbClr val="40A070"/>
+                </a:solidFill>
+                <a:latin typeface="Courier"/>
+              </a:rPr>
+              <a:t>90</a:t>
+            </a:r>
+            <a:r>
+              <a:rPr>
+                <a:latin typeface="Courier"/>
+              </a:rPr>
+              <a:t> Percent confidence interval </a:t>
+            </a:r>
+            <a:r>
+              <a:rPr>
+                <a:solidFill>
+                  <a:srgbClr val="4070A0"/>
+                </a:solidFill>
+                <a:latin typeface="Courier"/>
+              </a:rPr>
+              <a:t>-</a:t>
+            </a:r>
+            <a:r>
+              <a:rPr>
+                <a:latin typeface="Courier"/>
+              </a:rPr>
+              <a:t> upper         </a:t>
+            </a:r>
+            <a:r>
+              <a:rPr>
+                <a:solidFill>
+                  <a:srgbClr val="40A070"/>
+                </a:solidFill>
+                <a:latin typeface="Courier"/>
+              </a:rPr>
+              <a:t>0.113</a:t>
+            </a:r>
+            <a:br/>
+            <a:r>
+              <a:rPr>
+                <a:latin typeface="Courier"/>
+              </a:rPr>
+              <a:t>  P</a:t>
+            </a:r>
+            <a:r>
+              <a:rPr>
+                <a:solidFill>
+                  <a:srgbClr val="4070A0"/>
+                </a:solidFill>
+                <a:latin typeface="Courier"/>
+              </a:rPr>
+              <a:t>-</a:t>
+            </a:r>
+            <a:r>
+              <a:rPr>
+                <a:latin typeface="Courier"/>
+              </a:rPr>
+              <a:t>value H_0</a:t>
+            </a:r>
+            <a:r>
+              <a:rPr>
+                <a:solidFill>
+                  <a:srgbClr val="4070A0"/>
+                </a:solidFill>
+                <a:latin typeface="Courier"/>
+              </a:rPr>
+              <a:t>:</a:t>
+            </a:r>
+            <a:r>
+              <a:rPr>
+                <a:latin typeface="Courier"/>
+              </a:rPr>
+              <a:t> RMSEA </a:t>
+            </a:r>
+            <a:r>
+              <a:rPr>
+                <a:solidFill>
+                  <a:srgbClr val="4070A0"/>
+                </a:solidFill>
+                <a:latin typeface="Courier"/>
+              </a:rPr>
+              <a:t>&lt;=</a:t>
+            </a:r>
+            <a:r>
+              <a:rPr>
+                <a:latin typeface="Courier"/>
+              </a:rPr>
+              <a:t> </a:t>
+            </a:r>
+            <a:r>
+              <a:rPr>
+                <a:solidFill>
+                  <a:srgbClr val="40A070"/>
+                </a:solidFill>
+                <a:latin typeface="Courier"/>
+              </a:rPr>
+              <a:t>0.050</a:t>
+            </a:r>
+            <a:r>
+              <a:rPr>
+                <a:latin typeface="Courier"/>
+              </a:rPr>
+              <a:t>                    </a:t>
+            </a:r>
+            <a:r>
+              <a:rPr>
+                <a:solidFill>
+                  <a:srgbClr val="40A070"/>
+                </a:solidFill>
+                <a:latin typeface="Courier"/>
+              </a:rPr>
+              <a:t>0.000</a:t>
+            </a:r>
+            <a:br/>
+            <a:r>
+              <a:rPr>
+                <a:latin typeface="Courier"/>
+              </a:rPr>
+              <a:t>  P</a:t>
+            </a:r>
+            <a:r>
+              <a:rPr>
+                <a:solidFill>
+                  <a:srgbClr val="4070A0"/>
+                </a:solidFill>
+                <a:latin typeface="Courier"/>
+              </a:rPr>
+              <a:t>-</a:t>
+            </a:r>
+            <a:r>
+              <a:rPr>
+                <a:latin typeface="Courier"/>
+              </a:rPr>
+              <a:t>value H_0</a:t>
+            </a:r>
+            <a:r>
+              <a:rPr>
+                <a:solidFill>
+                  <a:srgbClr val="4070A0"/>
+                </a:solidFill>
+                <a:latin typeface="Courier"/>
+              </a:rPr>
+              <a:t>:</a:t>
+            </a:r>
+            <a:r>
+              <a:rPr>
+                <a:latin typeface="Courier"/>
+              </a:rPr>
+              <a:t> RMSEA </a:t>
+            </a:r>
+            <a:r>
+              <a:rPr>
+                <a:solidFill>
+                  <a:srgbClr val="4070A0"/>
+                </a:solidFill>
+                <a:latin typeface="Courier"/>
+              </a:rPr>
+              <a:t>&gt;=</a:t>
+            </a:r>
+            <a:r>
+              <a:rPr>
+                <a:latin typeface="Courier"/>
+              </a:rPr>
+              <a:t> </a:t>
+            </a:r>
+            <a:r>
+              <a:rPr>
+                <a:solidFill>
+                  <a:srgbClr val="40A070"/>
+                </a:solidFill>
+                <a:latin typeface="Courier"/>
+              </a:rPr>
+              <a:t>0.080</a:t>
+            </a:r>
+            <a:r>
+              <a:rPr>
+                <a:latin typeface="Courier"/>
+              </a:rPr>
+              <a:t>                    </a:t>
+            </a:r>
+            <a:r>
+              <a:rPr>
+                <a:solidFill>
+                  <a:srgbClr val="40A070"/>
+                </a:solidFill>
+                <a:latin typeface="Courier"/>
+              </a:rPr>
+              <a:t>1.000</a:t>
+            </a:r>
+            <a:br/>
+            <a:br/>
+            <a:r>
+              <a:rPr>
+                <a:latin typeface="Courier"/>
+              </a:rPr>
+              <a:t>Standardized Root Mean Square Residual</a:t>
+            </a:r>
+            <a:r>
+              <a:rPr>
+                <a:solidFill>
+                  <a:srgbClr val="4070A0"/>
+                </a:solidFill>
+                <a:latin typeface="Courier"/>
+              </a:rPr>
+              <a:t>:</a:t>
+            </a:r>
+            <a:br/>
+            <a:br/>
+            <a:r>
+              <a:rPr>
+                <a:latin typeface="Courier"/>
+              </a:rPr>
+              <a:t>  SRMR                                           </a:t>
+            </a:r>
+            <a:r>
+              <a:rPr>
+                <a:solidFill>
+                  <a:srgbClr val="40A070"/>
+                </a:solidFill>
+                <a:latin typeface="Courier"/>
+              </a:rPr>
+              <a:t>0.125</a:t>
+            </a:r>
+          </a:p>
+        </p:txBody>
+      </p:sp>
+    </p:spTree>
+  </p:cSld>
+</p:sld>
+</file>
+
+<file path=ppt/slides/slide16.xml><?xml version="1.0" encoding="utf-8"?>
+<p:sld xmlns:a="http://schemas.openxmlformats.org/drawingml/2006/main" xmlns:r="http://schemas.openxmlformats.org/officeDocument/2006/relationships" xmlns:p="http://schemas.openxmlformats.org/presentationml/2006/main">
+  <p:cSld>
+    <p:spTree>
+      <p:nvGrpSpPr>
+        <p:cNvPr id="1" name=""/>
+        <p:cNvGrpSpPr/>
+        <p:nvPr/>
+      </p:nvGrpSpPr>
+      <p:grpSpPr>
+        <a:xfrm>
+          <a:off x="0" y="0"/>
+          <a:ext cx="0" cy="0"/>
+          <a:chOff x="0" y="0"/>
+          <a:chExt cx="0" cy="0"/>
+        </a:xfrm>
+      </p:grpSpPr>
+      <p:sp>
+        <p:nvSpPr>
+          <p:cNvPr id="2" name="Title 1"/>
+          <p:cNvSpPr>
+            <a:spLocks noGrp="1"/>
+          </p:cNvSpPr>
+          <p:nvPr>
+            <p:ph type="title"/>
+          </p:nvPr>
+        </p:nvSpPr>
+        <p:spPr/>
+        <p:txBody>
+          <a:bodyPr/>
+          <a:lstStyle/>
+          <a:p>
+            <a:pPr lvl="0" indent="0" marL="0">
+              <a:buNone/>
+            </a:pPr>
+            <a:r>
+              <a:rPr/>
+              <a:t>Analysis</a:t>
+            </a:r>
+          </a:p>
+        </p:txBody>
+      </p:sp>
+      <p:sp>
+        <p:nvSpPr>
+          <p:cNvPr id="3" name="Content Placeholder 2"/>
+          <p:cNvSpPr>
+            <a:spLocks noGrp="1"/>
+          </p:cNvSpPr>
+          <p:nvPr>
+            <p:ph idx="1"/>
+          </p:nvPr>
+        </p:nvSpPr>
+        <p:spPr/>
+        <p:txBody>
+          <a:bodyPr/>
+          <a:lstStyle/>
+          <a:p>
+            <a:pPr lvl="0" indent="0" marL="0">
+              <a:buNone/>
+            </a:pPr>
+            <a:r>
+              <a:rPr/>
+              <a:t>The comparative fit index (CFI) and Tucker-Lewis Index (TLI) values of 0.632 and 0.602, respectively, are not very high, but are improved as compared to the previous model.</a:t>
+            </a:r>
+          </a:p>
+          <a:p>
+            <a:pPr lvl="0" indent="0" marL="0">
+              <a:buNone/>
+            </a:pPr>
+            <a:r>
+              <a:rPr/>
+              <a:t>The RMSEA value of 0.108 indicates a poor fit, but it is within the acceptable range of 0.08-0.10. The SRMR value of 0.125 is also within the acceptable range of 0.08-0.10.</a:t>
+            </a:r>
+          </a:p>
+          <a:p>
+            <a:pPr lvl="0" indent="0" marL="0">
+              <a:buNone/>
+            </a:pPr>
+            <a:r>
+              <a:rPr/>
+              <a:t>Looking at the parameter estimates, we can see that most of the factor loadings are significant, indicating that the latent variables are reliable measures of the constructs they represent. The covariances between the latent variables are also significant, indicating that there are relationships between the constructs.</a:t>
+            </a:r>
+          </a:p>
+          <a:p>
+            <a:pPr lvl="0" indent="0" marL="0">
+              <a:buNone/>
+            </a:pPr>
+            <a:r>
+              <a:rPr/>
+              <a:t>Overall, while the model fit is not perfect, it is an improvement over the previous model and can be considered acceptable. However, it is important to consider the context and purpose of the analysis and interpret the results accordingly.</a:t>
+            </a:r>
+          </a:p>
+        </p:txBody>
+      </p:sp>
+    </p:spTree>
+  </p:cSld>
+</p:sld>
+</file>
+
+<file path=ppt/slides/slide17.xml><?xml version="1.0" encoding="utf-8"?>
+<p:sld xmlns:a="http://schemas.openxmlformats.org/drawingml/2006/main" xmlns:r="http://schemas.openxmlformats.org/officeDocument/2006/relationships" xmlns:p="http://schemas.openxmlformats.org/presentationml/2006/main">
+  <p:cSld>
+    <p:spTree>
+      <p:nvGrpSpPr>
+        <p:cNvPr id="1" name=""/>
+        <p:cNvGrpSpPr/>
+        <p:nvPr/>
+      </p:nvGrpSpPr>
+      <p:grpSpPr>
+        <a:xfrm>
+          <a:off x="0" y="0"/>
+          <a:ext cx="0" cy="0"/>
+          <a:chOff x="0" y="0"/>
+          <a:chExt cx="0" cy="0"/>
+        </a:xfrm>
+      </p:grpSpPr>
+      <p:sp>
+        <p:nvSpPr>
+          <p:cNvPr id="2" name="Title 1"/>
+          <p:cNvSpPr>
+            <a:spLocks noGrp="1"/>
+          </p:cNvSpPr>
+          <p:nvPr>
+            <p:ph type="title"/>
+          </p:nvPr>
+        </p:nvSpPr>
+        <p:spPr/>
+        <p:txBody>
+          <a:bodyPr/>
+          <a:lstStyle/>
+          <a:p>
+            <a:pPr lvl="0" indent="0" marL="0">
+              <a:buNone/>
+            </a:pPr>
+            <a:r>
+              <a:rPr/>
+              <a:t>SEM Path Diagram</a:t>
             </a:r>
           </a:p>
         </p:txBody>
       </p:sp>
       <p:pic>
         <p:nvPicPr>
-          <p:cNvPr descr="powerpoint_files/figure-pptx/pressure-1.png" id="0" name="Picture 1"/>
+          <p:cNvPr descr="Rplot07.png" id="0" name="Picture 1"/>
           <p:cNvPicPr>
             <a:picLocks noGrp="1" noChangeAspect="1"/>
           </p:cNvPicPr>
@@ -3735,8 +5137,8 @@
         </p:blipFill>
         <p:spPr bwMode="auto">
           <a:xfrm>
-            <a:off x="2451100" y="1193800"/>
-            <a:ext cx="4241800" cy="3390900"/>
+            <a:off x="1333500" y="1193800"/>
+            <a:ext cx="6477000" cy="3390900"/>
           </a:xfrm>
           <a:prstGeom prst="rect">
             <a:avLst/>
@@ -3749,6 +5151,159 @@
           </a:ln>
         </p:spPr>
       </p:pic>
+    </p:spTree>
+  </p:cSld>
+</p:sld>
+</file>
+
+<file path=ppt/slides/slide18.xml><?xml version="1.0" encoding="utf-8"?>
+<p:sld xmlns:a="http://schemas.openxmlformats.org/drawingml/2006/main" xmlns:r="http://schemas.openxmlformats.org/officeDocument/2006/relationships" xmlns:p="http://schemas.openxmlformats.org/presentationml/2006/main">
+  <p:cSld>
+    <p:spTree>
+      <p:nvGrpSpPr>
+        <p:cNvPr id="1" name=""/>
+        <p:cNvGrpSpPr/>
+        <p:nvPr/>
+      </p:nvGrpSpPr>
+      <p:grpSpPr>
+        <a:xfrm>
+          <a:off x="0" y="0"/>
+          <a:ext cx="0" cy="0"/>
+          <a:chOff x="0" y="0"/>
+          <a:chExt cx="0" cy="0"/>
+        </a:xfrm>
+      </p:grpSpPr>
+      <p:sp>
+        <p:nvSpPr>
+          <p:cNvPr id="2" name="Title 1"/>
+          <p:cNvSpPr>
+            <a:spLocks noGrp="1"/>
+          </p:cNvSpPr>
+          <p:nvPr>
+            <p:ph type="title"/>
+          </p:nvPr>
+        </p:nvSpPr>
+        <p:spPr/>
+        <p:txBody>
+          <a:bodyPr/>
+          <a:lstStyle/>
+          <a:p>
+            <a:pPr lvl="0" indent="0" marL="0">
+              <a:buNone/>
+            </a:pPr>
+            <a:r>
+              <a:rPr/>
+              <a:t>Analysis</a:t>
+            </a:r>
+          </a:p>
+        </p:txBody>
+      </p:sp>
+      <p:sp>
+        <p:nvSpPr>
+          <p:cNvPr id="3" name="Content Placeholder 2"/>
+          <p:cNvSpPr>
+            <a:spLocks noGrp="1"/>
+          </p:cNvSpPr>
+          <p:nvPr>
+            <p:ph idx="1"/>
+          </p:nvPr>
+        </p:nvSpPr>
+        <p:spPr/>
+        <p:txBody>
+          <a:bodyPr/>
+          <a:lstStyle/>
+          <a:p>
+            <a:pPr lvl="0" indent="0" marL="0">
+              <a:buNone/>
+            </a:pPr>
+            <a:r>
+              <a:rPr/>
+              <a:t>The latent variables in the model are PE (perceived ease of use), EF (perceived usefulness), FC (facilitating conditions), HM (habit), SI (social influence), IU (internet use behavior), and UB (usage behavior).</a:t>
+            </a:r>
+          </a:p>
+          <a:p>
+            <a:pPr lvl="0" indent="0" marL="0">
+              <a:buNone/>
+            </a:pPr>
+            <a:r>
+              <a:rPr/>
+              <a:t>The regression coefficients show the relationship between the latent variables. The results show that IU has a positive relationship with SI, HM, and UB, and a weak positive relationship with PE and a weak negative relationship with EF. UB has a positive relationship with IU.</a:t>
+            </a:r>
+          </a:p>
+        </p:txBody>
+      </p:sp>
+    </p:spTree>
+  </p:cSld>
+</p:sld>
+</file>
+
+<file path=ppt/slides/slide19.xml><?xml version="1.0" encoding="utf-8"?>
+<p:sld xmlns:a="http://schemas.openxmlformats.org/drawingml/2006/main" xmlns:r="http://schemas.openxmlformats.org/officeDocument/2006/relationships" xmlns:p="http://schemas.openxmlformats.org/presentationml/2006/main">
+  <p:cSld>
+    <p:spTree>
+      <p:nvGrpSpPr>
+        <p:cNvPr id="1" name=""/>
+        <p:cNvGrpSpPr/>
+        <p:nvPr/>
+      </p:nvGrpSpPr>
+      <p:grpSpPr>
+        <a:xfrm>
+          <a:off x="0" y="0"/>
+          <a:ext cx="0" cy="0"/>
+          <a:chOff x="0" y="0"/>
+          <a:chExt cx="0" cy="0"/>
+        </a:xfrm>
+      </p:grpSpPr>
+      <p:sp>
+        <p:nvSpPr>
+          <p:cNvPr id="2" name="Title 1"/>
+          <p:cNvSpPr>
+            <a:spLocks noGrp="1"/>
+          </p:cNvSpPr>
+          <p:nvPr>
+            <p:ph type="title"/>
+          </p:nvPr>
+        </p:nvSpPr>
+        <p:spPr/>
+        <p:txBody>
+          <a:bodyPr/>
+          <a:lstStyle/>
+          <a:p>
+            <a:pPr lvl="0" indent="0" marL="0">
+              <a:buNone/>
+            </a:pPr>
+            <a:r>
+              <a:rPr/>
+              <a:t>Analysis</a:t>
+            </a:r>
+          </a:p>
+        </p:txBody>
+      </p:sp>
+      <p:sp>
+        <p:nvSpPr>
+          <p:cNvPr id="3" name="Content Placeholder 2"/>
+          <p:cNvSpPr>
+            <a:spLocks noGrp="1"/>
+          </p:cNvSpPr>
+          <p:nvPr>
+            <p:ph idx="1"/>
+          </p:nvPr>
+        </p:nvSpPr>
+        <p:spPr/>
+        <p:txBody>
+          <a:bodyPr/>
+          <a:lstStyle/>
+          <a:p>
+            <a:pPr lvl="0" indent="0" marL="0">
+              <a:buNone/>
+            </a:pPr>
+            <a:r>
+              <a:rPr/>
+              <a:t>Performance Expectancy (PE) construct significantly covaries with the Effort Expectancy (EF), Habit (HB), Social Influence (SI), and Hedonic Motivation (HM) constructs. The relationship between PE and EF, HM, and SI is positive, while the relationship between PE and HB is negative. EF significantly covaries with FC, and the relationship is positive. HM significantly covaries with SI, and the relationship is positive. SI significantly covaries with HB and FC, and the relationship is positive.</a:t>
+            </a:r>
+          </a:p>
+        </p:txBody>
+      </p:sp>
     </p:spTree>
   </p:cSld>
 </p:sld>
@@ -3816,7 +5371,7 @@
             </a:pPr>
             <a:r>
               <a:rPr/>
-              <a:t>Using Bayesian analysis, examined the factors that influence students’ intention to use e-learning via Facebook. The authors collected data from 170 students enrolled in a business statistics course at the University of Malaya, Malaysia. They tested the data using maximum likelihood and Bayesian approaches.</a:t>
+              <a:t>The purpose of this research is to compare and evaluate two models of the Unified Theory of Acceptance and Use of Technology 2 (UTAUT2) framework, using structural equation modeling (SEM) techniques. The authors collected data from 170 students enrolled in a business statistics course at the University of Malaya, Malaysia. They tested the data using maximum likelihood and Bayesian approaches. ((Jenatabadi et al. 2017)</a:t>
             </a:r>
           </a:p>
           <a:p>
@@ -3825,7 +5380,360 @@
             </a:pPr>
             <a:r>
               <a:rPr/>
-              <a:t>As a part of the data analysis project, I analyzed the raw data provided by the authors using STATA and lavaan to run a full structural equation modeling of the questionnaires. The instrument used in the survey was UTAUT (Unified Theory of Acceptance and Use of Technology).</a:t>
+              <a:t>I analyzed the raw data provided by the authors using STATA and lavaan to run a full structural equation modeling of the questionnaires.</a:t>
+            </a:r>
+          </a:p>
+        </p:txBody>
+      </p:sp>
+    </p:spTree>
+  </p:cSld>
+</p:sld>
+</file>
+
+<file path=ppt/slides/slide20.xml><?xml version="1.0" encoding="utf-8"?>
+<p:sld xmlns:a="http://schemas.openxmlformats.org/drawingml/2006/main" xmlns:r="http://schemas.openxmlformats.org/officeDocument/2006/relationships" xmlns:p="http://schemas.openxmlformats.org/presentationml/2006/main">
+  <p:cSld>
+    <p:spTree>
+      <p:nvGrpSpPr>
+        <p:cNvPr id="1" name=""/>
+        <p:cNvGrpSpPr/>
+        <p:nvPr/>
+      </p:nvGrpSpPr>
+      <p:grpSpPr>
+        <a:xfrm>
+          <a:off x="0" y="0"/>
+          <a:ext cx="0" cy="0"/>
+          <a:chOff x="0" y="0"/>
+          <a:chExt cx="0" cy="0"/>
+        </a:xfrm>
+      </p:grpSpPr>
+      <p:sp>
+        <p:nvSpPr>
+          <p:cNvPr id="2" name="Title 1"/>
+          <p:cNvSpPr>
+            <a:spLocks noGrp="1"/>
+          </p:cNvSpPr>
+          <p:nvPr>
+            <p:ph type="title"/>
+          </p:nvPr>
+        </p:nvSpPr>
+        <p:spPr/>
+        <p:txBody>
+          <a:bodyPr/>
+          <a:lstStyle/>
+          <a:p>
+            <a:pPr lvl="0" indent="0" marL="0">
+              <a:buNone/>
+            </a:pPr>
+            <a:r>
+              <a:rPr/>
+              <a:t>Analysis</a:t>
+            </a:r>
+          </a:p>
+        </p:txBody>
+      </p:sp>
+      <p:sp>
+        <p:nvSpPr>
+          <p:cNvPr id="3" name="Content Placeholder 2"/>
+          <p:cNvSpPr>
+            <a:spLocks noGrp="1"/>
+          </p:cNvSpPr>
+          <p:nvPr>
+            <p:ph idx="1"/>
+          </p:nvPr>
+        </p:nvSpPr>
+        <p:spPr/>
+        <p:txBody>
+          <a:bodyPr/>
+          <a:lstStyle/>
+          <a:p>
+            <a:pPr lvl="0" indent="0" marL="0">
+              <a:buNone/>
+            </a:pPr>
+            <a:r>
+              <a:rPr/>
+              <a:t>In the given model, the R-squared values of the indicator variables ranged from 0.148 to 0.844, indicating that the latent variables explain a moderate to a high amount of variance in their corresponding indicators. The highest R-squared value was observed for the first item of the Habit (HB) construct, and the lowest R-squared value was observed for the first item of the Effort Expectancy (EF) construct.</a:t>
+            </a:r>
+          </a:p>
+        </p:txBody>
+      </p:sp>
+    </p:spTree>
+  </p:cSld>
+</p:sld>
+</file>
+
+<file path=ppt/slides/slide21.xml><?xml version="1.0" encoding="utf-8"?>
+<p:sld xmlns:a="http://schemas.openxmlformats.org/drawingml/2006/main" xmlns:r="http://schemas.openxmlformats.org/officeDocument/2006/relationships" xmlns:p="http://schemas.openxmlformats.org/presentationml/2006/main">
+  <p:cSld>
+    <p:spTree>
+      <p:nvGrpSpPr>
+        <p:cNvPr id="1" name=""/>
+        <p:cNvGrpSpPr/>
+        <p:nvPr/>
+      </p:nvGrpSpPr>
+      <p:grpSpPr>
+        <a:xfrm>
+          <a:off x="0" y="0"/>
+          <a:ext cx="0" cy="0"/>
+          <a:chOff x="0" y="0"/>
+          <a:chExt cx="0" cy="0"/>
+        </a:xfrm>
+      </p:grpSpPr>
+      <p:sp>
+        <p:nvSpPr>
+          <p:cNvPr id="2" name="Title 1"/>
+          <p:cNvSpPr>
+            <a:spLocks noGrp="1"/>
+          </p:cNvSpPr>
+          <p:nvPr>
+            <p:ph type="title"/>
+          </p:nvPr>
+        </p:nvSpPr>
+        <p:spPr/>
+        <p:txBody>
+          <a:bodyPr/>
+          <a:lstStyle/>
+          <a:p>
+            <a:pPr lvl="0" indent="0" marL="0">
+              <a:buNone/>
+            </a:pPr>
+            <a:r>
+              <a:rPr/>
+              <a:t>Discussion</a:t>
+            </a:r>
+          </a:p>
+        </p:txBody>
+      </p:sp>
+      <p:sp>
+        <p:nvSpPr>
+          <p:cNvPr id="3" name="Content Placeholder 2"/>
+          <p:cNvSpPr>
+            <a:spLocks noGrp="1"/>
+          </p:cNvSpPr>
+          <p:nvPr>
+            <p:ph idx="1"/>
+          </p:nvPr>
+        </p:nvSpPr>
+        <p:spPr/>
+        <p:txBody>
+          <a:bodyPr/>
+          <a:lstStyle/>
+          <a:p>
+            <a:pPr lvl="0" indent="0" marL="0">
+              <a:buNone/>
+            </a:pPr>
+            <a:r>
+              <a:rPr/>
+              <a:t>The results of this study suggest that both models of the UTAUT2 framework have significant relationships between the constructs. However, the modified model had better fit indices than the original model. The findings of this study are consistent with previous research that has found social influence to be a significant predictor of technology acceptance and use.</a:t>
+            </a:r>
+          </a:p>
+        </p:txBody>
+      </p:sp>
+    </p:spTree>
+  </p:cSld>
+</p:sld>
+</file>
+
+<file path=ppt/slides/slide22.xml><?xml version="1.0" encoding="utf-8"?>
+<p:sld xmlns:a="http://schemas.openxmlformats.org/drawingml/2006/main" xmlns:r="http://schemas.openxmlformats.org/officeDocument/2006/relationships" xmlns:p="http://schemas.openxmlformats.org/presentationml/2006/main">
+  <p:cSld>
+    <p:spTree>
+      <p:nvGrpSpPr>
+        <p:cNvPr id="1" name=""/>
+        <p:cNvGrpSpPr/>
+        <p:nvPr/>
+      </p:nvGrpSpPr>
+      <p:grpSpPr>
+        <a:xfrm>
+          <a:off x="0" y="0"/>
+          <a:ext cx="0" cy="0"/>
+          <a:chOff x="0" y="0"/>
+          <a:chExt cx="0" cy="0"/>
+        </a:xfrm>
+      </p:grpSpPr>
+      <p:sp>
+        <p:nvSpPr>
+          <p:cNvPr id="2" name="Title 1"/>
+          <p:cNvSpPr>
+            <a:spLocks noGrp="1"/>
+          </p:cNvSpPr>
+          <p:nvPr>
+            <p:ph type="title"/>
+          </p:nvPr>
+        </p:nvSpPr>
+        <p:spPr/>
+        <p:txBody>
+          <a:bodyPr/>
+          <a:lstStyle/>
+          <a:p>
+            <a:pPr lvl="0" indent="0" marL="0">
+              <a:buNone/>
+            </a:pPr>
+            <a:r>
+              <a:rPr/>
+              <a:t>References</a:t>
+            </a:r>
+          </a:p>
+        </p:txBody>
+      </p:sp>
+      <p:sp>
+        <p:nvSpPr>
+          <p:cNvPr id="3" name="Content Placeholder 2"/>
+          <p:cNvSpPr>
+            <a:spLocks noGrp="1"/>
+          </p:cNvSpPr>
+          <p:nvPr>
+            <p:ph idx="1"/>
+          </p:nvPr>
+        </p:nvSpPr>
+        <p:spPr/>
+        <p:txBody>
+          <a:bodyPr/>
+          <a:lstStyle/>
+          <a:p>
+            <a:pPr lvl="0" indent="0" marL="0">
+              <a:buNone/>
+            </a:pPr>
+            <a:r>
+              <a:rPr/>
+              <a:t>Jenatabadi, Hashem Salarzadeh, Sedigheh Moghavvemi, Che Wan Jasimah Bt Wan Mohamed Radzi, Parastoo Babashamsi, and Mohammad Arashi. 2017. “Testing Students’ e-Learning via Facebook Through Bayesian Structural Equation Modeling.” </a:t>
+            </a:r>
+            <a:r>
+              <a:rPr i="1"/>
+              <a:t>PLOS ONE</a:t>
+            </a:r>
+            <a:r>
+              <a:rPr/>
+              <a:t> 12 (9): e0182311. </a:t>
+            </a:r>
+            <a:r>
+              <a:rPr>
+                <a:hlinkClick r:id="rId2"/>
+              </a:rPr>
+              <a:t>https://doi.org/10.1371/journal.pone.0182311</a:t>
+            </a:r>
+            <a:r>
+              <a:rPr/>
+              <a:t>.</a:t>
+            </a:r>
+          </a:p>
+          <a:p>
+            <a:pPr lvl="0" indent="0" marL="0">
+              <a:buNone/>
+            </a:pPr>
+            <a:r>
+              <a:rPr/>
+              <a:t>Lishinski, Alex. 2021. “lavaanPlot: Path Diagrams for ’Lavaan’ Models via ’DiagrammeR’.” </a:t>
+            </a:r>
+            <a:r>
+              <a:rPr>
+                <a:hlinkClick r:id="rId3"/>
+              </a:rPr>
+              <a:t>https://CRAN.R-project.org/package=lavaanPlot</a:t>
+            </a:r>
+            <a:r>
+              <a:rPr/>
+              <a:t>.</a:t>
+            </a:r>
+          </a:p>
+          <a:p>
+            <a:pPr lvl="0" indent="0" marL="0">
+              <a:buNone/>
+            </a:pPr>
+            <a:r>
+              <a:rPr/>
+              <a:t>Rosseel, Yves. 2012. “Lavaan: An r Package for Structural Equation Modeling” 48. </a:t>
+            </a:r>
+            <a:r>
+              <a:rPr>
+                <a:hlinkClick r:id="rId4"/>
+              </a:rPr>
+              <a:t>https://doi.org/10.18637/jss.v048.i02</a:t>
+            </a:r>
+            <a:r>
+              <a:rPr/>
+              <a:t>.</a:t>
+            </a:r>
+          </a:p>
+          <a:p>
+            <a:pPr lvl="0" indent="0" marL="0">
+              <a:buNone/>
+            </a:pPr>
+            <a:r>
+              <a:rPr/>
+              <a:t>Tamilmani, Kuttimani, Nripendra P. Rana, Samuel Fosso Wamba, and Rohita Dwivedi. 2021. “The Extended Unified Theory of Acceptance and Use of Technology (UTAUT2): A Systematic Literature Review and Theory Evaluation.” </a:t>
+            </a:r>
+            <a:r>
+              <a:rPr i="1"/>
+              <a:t>International Journal of Information Management</a:t>
+            </a:r>
+            <a:r>
+              <a:rPr/>
+              <a:t> 57 (C). </a:t>
+            </a:r>
+            <a:r>
+              <a:rPr>
+                <a:hlinkClick r:id="rId5"/>
+              </a:rPr>
+              <a:t>https://ideas.repec.org//a/eee/ininma/v57y2021ics0268401220314687.html</a:t>
+            </a:r>
+            <a:r>
+              <a:rPr/>
+              <a:t>.</a:t>
+            </a:r>
+          </a:p>
+          <a:p>
+            <a:pPr lvl="0" indent="0" marL="0">
+              <a:buNone/>
+            </a:pPr>
+            <a:r>
+              <a:rPr/>
+              <a:t>Venkatesh, Viswanath, Michael G. Morris, Gordon B. Davis, and Fred D. Davis. 2003. “User Acceptance of Information Technology: Toward a Unified View.” </a:t>
+            </a:r>
+            <a:r>
+              <a:rPr i="1"/>
+              <a:t>MIS Quarterly</a:t>
+            </a:r>
+            <a:r>
+              <a:rPr/>
+              <a:t> 27 (3): 425–78. </a:t>
+            </a:r>
+            <a:r>
+              <a:rPr>
+                <a:hlinkClick r:id="rId6"/>
+              </a:rPr>
+              <a:t>https://doi.org/10.2307/30036540</a:t>
+            </a:r>
+            <a:r>
+              <a:rPr/>
+              <a:t>.</a:t>
+            </a:r>
+          </a:p>
+          <a:p>
+            <a:pPr lvl="0" indent="0" marL="0">
+              <a:buNone/>
+            </a:pPr>
+            <a:r>
+              <a:rPr/>
+              <a:t>Venkatesh, Viswanath, James Y. L. Thong, and Xin Xu. 2012. “Consumer Acceptance and Use of Information Technology: Extending the Unified Theory of Acceptance and Use of Technology.” </a:t>
+            </a:r>
+            <a:r>
+              <a:rPr i="1"/>
+              <a:t>MIS Quarterly</a:t>
+            </a:r>
+            <a:r>
+              <a:rPr/>
+              <a:t> 36 (1): 157–78. </a:t>
+            </a:r>
+            <a:r>
+              <a:rPr>
+                <a:hlinkClick r:id="rId7"/>
+              </a:rPr>
+              <a:t>https://doi.org/10.2307/41410412</a:t>
+            </a:r>
+            <a:r>
+              <a:rPr/>
+              <a:t>.</a:t>
             </a:r>
           </a:p>
         </p:txBody>
@@ -3897,16 +5805,7 @@
             </a:pPr>
             <a:r>
               <a:rPr/>
-              <a:t>As a part of the data analysis project, I analyzed the raw data provided by the authors using STATA and lavaan to run a full structural equation modeling of the questionnaires. The instrument used in the survey was UTAUT (Unified Theory of Acceptance and Use of Technology).</a:t>
-            </a:r>
-          </a:p>
-          <a:p>
-            <a:pPr lvl="0" indent="0" marL="0">
-              <a:buNone/>
-            </a:pPr>
-            <a:r>
-              <a:rPr/>
-              <a:t>The Unified Theory of Acceptance and Use of Technology (UTAUT) is a widely used theoretical model for studying technology acceptance and user behavior in various contexts. UTAUT proposes that behavioral intention to use technology is determined by four main constructs: performance expectancy, effort expectancy, social influence, and facilitating conditions. Several moderators, such as gender, age, experience, and voluntariness of use influence these constructs. The most recent version of UTAUT is UTAUT2, which incorporates additional constructs such as hedonic motivation, price value, and habit.</a:t>
+              <a:t>The Unified Theory of Acceptance and Use of Technology (UTAUT) is a widely used theoretical model for studying technology acceptance and user behavior in various contexts. UTAUT proposes that behavioral intention to use technology is determined by four main constructs: performance expectancy, effort expectancy, social influence, and facilitating conditions. (Venkatesh et al. 2003) Several moderators, such as gender, age, experience, and voluntariness of use influence these constructs. The most recent version of UTAUT is UTAUT2, which incorporates additional constructs such as hedonic motivation, price value, and habit. (Venkatesh, Thong, and Xu 2012)</a:t>
             </a:r>
           </a:p>
         </p:txBody>
@@ -3978,7 +5877,7 @@
             </a:pPr>
             <a:r>
               <a:rPr/>
-              <a:t>UTAUT2 incorporates seven key constructs that explain user behavior toward technology adoption.</a:t>
+              <a:t>The key constructs of UTAUT2 framework are:</a:t>
             </a:r>
           </a:p>
           <a:p>
@@ -4093,7 +5992,7 @@
             </a:r>
             <a:r>
               <a:rPr/>
-              <a:t> This refers to the degree to which an individual believes that the organizational and technical infrastructure is in place to support technology use. It includes technical support, which is the degree to which an individual perceives that technical assistance is available when needed, and infrastructure, which is the degree to which an individual perceives that the necessary product is available.</a:t>
+              <a:t> It includes technical support, which is the degree to which an individual perceives that technical assistance is available when needed, and infrastructure, which is the degree to which an individual perceives that the necessary product is available.</a:t>
             </a:r>
           </a:p>
         </p:txBody>
@@ -4169,7 +6068,7 @@
             </a:r>
             <a:r>
               <a:rPr/>
-              <a:t> This construct refers to the degree to which an individual perceives that using technology is fun, entertaining, and enjoyable. It includes intrinsic motivation, which is the degree to which an individual is motivated to use technology because they find it enjoyable or satisfying, and enjoyment, which is the degree to which an individual finds using technology enjoyable.</a:t>
+              <a:t> This construct refers to the degree to which an individual perceives that using technology is fun, entertaining, and enjoyable. It includes intrinsic motivation, which is the degree to which an individual is motivated to use technology because they find it enjoyable or satisfying, and enjoyment.</a:t>
             </a:r>
           </a:p>
           <a:p>
@@ -4178,11 +6077,11 @@
             </a:pPr>
             <a:r>
               <a:rPr b="1"/>
-              <a:t>Price value:</a:t>
+              <a:t>Habit:</a:t>
             </a:r>
             <a:r>
               <a:rPr/>
-              <a:t> This construct refers to the degree to which an individual perceives that the benefits of using technology outweigh its cost. It includes the perceived value, which is the degree to which an individual perceives that the benefits of using technology are greater than its cost.</a:t>
+              <a:t> Habit refers to the degree to which an individual has developed a pattern of using technology regularly. It includes habit strength, the degree to which an individual’s behavior towards technology is automatic and without conscious thought. (Tamilmani et al. 2021)</a:t>
             </a:r>
           </a:p>
         </p:txBody>
@@ -4219,6 +6118,36 @@
             <p:ph type="title"/>
           </p:nvPr>
         </p:nvSpPr>
+        <p:spPr>
+          <a:xfrm>
+            <a:off x="457201" y="204787"/>
+            <a:ext cx="3008313" cy="871538"/>
+          </a:xfrm>
+        </p:spPr>
+        <p:txBody>
+          <a:bodyPr/>
+          <a:lstStyle/>
+          <a:p>
+            <a:pPr lvl="0" indent="0" marL="0">
+              <a:buNone/>
+            </a:pPr>
+            <a:r>
+              <a:rPr/>
+              <a:t>UTAUT2 Structural Equation Modelling</a:t>
+            </a:r>
+          </a:p>
+        </p:txBody>
+      </p:sp>
+      <p:sp>
+        <p:nvSpPr>
+          <p:cNvPr id="4" name="Text Placeholder 3"/>
+          <p:cNvSpPr>
+            <a:spLocks noGrp="1"/>
+          </p:cNvSpPr>
+          <p:nvPr>
+            <p:ph idx="2" sz="half" type="body"/>
+          </p:nvPr>
+        </p:nvSpPr>
         <p:spPr/>
         <p:txBody>
           <a:bodyPr/>
@@ -4229,40 +6158,41 @@
             </a:pPr>
             <a:r>
               <a:rPr/>
-              <a:t>Literature Review</a:t>
-            </a:r>
-          </a:p>
-        </p:txBody>
-      </p:sp>
-      <p:sp>
-        <p:nvSpPr>
-          <p:cNvPr id="3" name="Content Placeholder 2"/>
-          <p:cNvSpPr>
-            <a:spLocks noGrp="1"/>
-          </p:cNvSpPr>
-          <p:nvPr>
-            <p:ph idx="1"/>
-          </p:nvPr>
-        </p:nvSpPr>
-        <p:spPr/>
-        <p:txBody>
-          <a:bodyPr/>
-          <a:lstStyle/>
-          <a:p>
-            <a:pPr lvl="0" indent="0" marL="0">
-              <a:buNone/>
-            </a:pPr>
-            <a:r>
-              <a:rPr b="1"/>
-              <a:t>Habit:</a:t>
-            </a:r>
-            <a:r>
-              <a:rPr/>
-              <a:t> Habit refers to the degree to which an individual has developed a pattern of using technology regularly. It includes habit strength, the degree to which an individual’s behavior towards technology is automatic and without conscious thought.</a:t>
-            </a:r>
-          </a:p>
-        </p:txBody>
-      </p:sp>
+              <a:t>The research framework is :</a:t>
+            </a:r>
+          </a:p>
+        </p:txBody>
+      </p:sp>
+      <p:pic>
+        <p:nvPicPr>
+          <p:cNvPr descr="pone.0182311.g001%20(1).png" id="0" name="Picture 1"/>
+          <p:cNvPicPr>
+            <a:picLocks noGrp="1" noChangeAspect="1"/>
+          </p:cNvPicPr>
+          <p:nvPr/>
+        </p:nvPicPr>
+        <p:blipFill>
+          <a:blip r:embed="rId2"/>
+          <a:stretch>
+            <a:fillRect/>
+          </a:stretch>
+        </p:blipFill>
+        <p:spPr bwMode="auto">
+          <a:xfrm>
+            <a:off x="3568700" y="1244600"/>
+            <a:ext cx="5105400" cy="2286000"/>
+          </a:xfrm>
+          <a:prstGeom prst="rect">
+            <a:avLst/>
+          </a:prstGeom>
+          <a:noFill/>
+          <a:ln w="9525">
+            <a:noFill/>
+            <a:headEnd/>
+            <a:tailEnd/>
+          </a:ln>
+        </p:spPr>
+      </p:pic>
     </p:spTree>
   </p:cSld>
 </p:sld>
@@ -4305,7 +6235,7 @@
             </a:pPr>
             <a:r>
               <a:rPr/>
-              <a:t>R Markdown</a:t>
+              <a:t>Testing the Author’s Framework</a:t>
             </a:r>
           </a:p>
         </p:txBody>
@@ -4330,34 +6260,366 @@
             </a:pPr>
             <a:r>
               <a:rPr/>
-              <a:t>This is an R Markdown presentation. Markdown is a simple formatting syntax for authoring HTML, PDF, and MS Word documents. For more details on using R Markdown see </a:t>
-            </a:r>
-            <a:r>
-              <a:rPr>
-                <a:hlinkClick r:id="rId2"/>
-              </a:rPr>
-              <a:t>http://rmarkdown.rstudio.com</a:t>
-            </a:r>
-            <a:r>
-              <a:rPr/>
-              <a:t>.</a:t>
-            </a:r>
-          </a:p>
-          <a:p>
-            <a:pPr lvl="0" indent="0" marL="0">
+              <a:t>I tested the original research model using lavaan : (Rosseel 2012)</a:t>
+            </a:r>
+          </a:p>
+          <a:p>
+            <a:pPr lvl="0" indent="0">
               <a:buNone/>
             </a:pPr>
             <a:r>
-              <a:rPr/>
-              <a:t>When you click the </a:t>
-            </a:r>
-            <a:r>
-              <a:rPr b="1"/>
-              <a:t>Knit</a:t>
-            </a:r>
-            <a:r>
-              <a:rPr/>
-              <a:t> button a document will be generated that includes both content as well as the output of any embedded R code chunks within the document.</a:t>
+              <a:rPr i="1">
+                <a:solidFill>
+                  <a:srgbClr val="60A0B0"/>
+                </a:solidFill>
+                <a:latin typeface="Courier"/>
+              </a:rPr>
+              <a:t># Specify the model</a:t>
+            </a:r>
+            <a:br/>
+            <a:r>
+              <a:rPr>
+                <a:latin typeface="Courier"/>
+              </a:rPr>
+              <a:t>model1 </a:t>
+            </a:r>
+            <a:r>
+              <a:rPr>
+                <a:solidFill>
+                  <a:srgbClr val="007020"/>
+                </a:solidFill>
+                <a:latin typeface="Courier"/>
+              </a:rPr>
+              <a:t>&lt;-</a:t>
+            </a:r>
+            <a:r>
+              <a:rPr>
+                <a:latin typeface="Courier"/>
+              </a:rPr>
+              <a:t> </a:t>
+            </a:r>
+            <a:r>
+              <a:rPr>
+                <a:solidFill>
+                  <a:srgbClr val="4070A0"/>
+                </a:solidFill>
+                <a:latin typeface="Courier"/>
+              </a:rPr>
+              <a:t>'</a:t>
+            </a:r>
+            <a:br/>
+            <a:r>
+              <a:rPr>
+                <a:solidFill>
+                  <a:srgbClr val="4070A0"/>
+                </a:solidFill>
+                <a:latin typeface="Courier"/>
+              </a:rPr>
+              <a:t>   # UTAUT2 Measurement Model</a:t>
+            </a:r>
+            <a:br/>
+            <a:r>
+              <a:rPr>
+                <a:solidFill>
+                  <a:srgbClr val="4070A0"/>
+                </a:solidFill>
+                <a:latin typeface="Courier"/>
+              </a:rPr>
+              <a:t>  </a:t>
+            </a:r>
+            <a:br/>
+            <a:r>
+              <a:rPr>
+                <a:solidFill>
+                  <a:srgbClr val="4070A0"/>
+                </a:solidFill>
+                <a:latin typeface="Courier"/>
+              </a:rPr>
+              <a:t>   PE =~ PE1+PE2+PE3+PE4+PE5</a:t>
+            </a:r>
+            <a:br/>
+            <a:r>
+              <a:rPr>
+                <a:solidFill>
+                  <a:srgbClr val="4070A0"/>
+                </a:solidFill>
+                <a:latin typeface="Courier"/>
+              </a:rPr>
+              <a:t>   EF =~ EF1+EF2+EF3+EF4</a:t>
+            </a:r>
+            <a:br/>
+            <a:r>
+              <a:rPr>
+                <a:solidFill>
+                  <a:srgbClr val="4070A0"/>
+                </a:solidFill>
+                <a:latin typeface="Courier"/>
+              </a:rPr>
+              <a:t>   FC =~ FC1+FC2+FC3+FC4+FC5</a:t>
+            </a:r>
+            <a:br/>
+            <a:r>
+              <a:rPr>
+                <a:solidFill>
+                  <a:srgbClr val="4070A0"/>
+                </a:solidFill>
+                <a:latin typeface="Courier"/>
+              </a:rPr>
+              <a:t>   HM =~ HM1+HM2+HM3+HM4</a:t>
+            </a:r>
+            <a:br/>
+            <a:r>
+              <a:rPr>
+                <a:solidFill>
+                  <a:srgbClr val="4070A0"/>
+                </a:solidFill>
+                <a:latin typeface="Courier"/>
+              </a:rPr>
+              <a:t>   SI =~ SI1+SI2+SI3+SI4</a:t>
+            </a:r>
+            <a:br/>
+            <a:r>
+              <a:rPr>
+                <a:solidFill>
+                  <a:srgbClr val="4070A0"/>
+                </a:solidFill>
+                <a:latin typeface="Courier"/>
+              </a:rPr>
+              <a:t>   HB =~ Habit1+Habit2+Habit3+Habit4 </a:t>
+            </a:r>
+            <a:br/>
+            <a:r>
+              <a:rPr>
+                <a:solidFill>
+                  <a:srgbClr val="4070A0"/>
+                </a:solidFill>
+                <a:latin typeface="Courier"/>
+              </a:rPr>
+              <a:t>   IU =~ ITU1+ITU2+ITU3+ITU4+ITU5+ITU6+ITU7+ITU8+ITU8+ITU9+ITU10+ITU11</a:t>
+            </a:r>
+            <a:br/>
+            <a:r>
+              <a:rPr>
+                <a:solidFill>
+                  <a:srgbClr val="4070A0"/>
+                </a:solidFill>
+                <a:latin typeface="Courier"/>
+              </a:rPr>
+              <a:t>   UB =~ UB1+UB2+UB3+UB4</a:t>
+            </a:r>
+            <a:br/>
+            <a:r>
+              <a:rPr>
+                <a:solidFill>
+                  <a:srgbClr val="4070A0"/>
+                </a:solidFill>
+                <a:latin typeface="Courier"/>
+              </a:rPr>
+              <a:t>  </a:t>
+            </a:r>
+            <a:br/>
+            <a:r>
+              <a:rPr>
+                <a:solidFill>
+                  <a:srgbClr val="4070A0"/>
+                </a:solidFill>
+                <a:latin typeface="Courier"/>
+              </a:rPr>
+              <a:t>  #UTAUT2 Structural Model</a:t>
+            </a:r>
+            <a:br/>
+            <a:r>
+              <a:rPr>
+                <a:solidFill>
+                  <a:srgbClr val="4070A0"/>
+                </a:solidFill>
+                <a:latin typeface="Courier"/>
+              </a:rPr>
+              <a:t>  IU ~ PE+EF+FC+HM+SI+HB</a:t>
+            </a:r>
+            <a:br/>
+            <a:r>
+              <a:rPr>
+                <a:solidFill>
+                  <a:srgbClr val="4070A0"/>
+                </a:solidFill>
+                <a:latin typeface="Courier"/>
+              </a:rPr>
+              <a:t>  UB ~ HB+IU+FC</a:t>
+            </a:r>
+            <a:br/>
+            <a:r>
+              <a:rPr>
+                <a:solidFill>
+                  <a:srgbClr val="4070A0"/>
+                </a:solidFill>
+                <a:latin typeface="Courier"/>
+              </a:rPr>
+              <a:t>'</a:t>
+            </a:r>
+            <a:br/>
+            <a:br/>
+            <a:r>
+              <a:rPr i="1">
+                <a:solidFill>
+                  <a:srgbClr val="60A0B0"/>
+                </a:solidFill>
+                <a:latin typeface="Courier"/>
+              </a:rPr>
+              <a:t># Fitting the model</a:t>
+            </a:r>
+            <a:br/>
+            <a:r>
+              <a:rPr>
+                <a:latin typeface="Courier"/>
+              </a:rPr>
+              <a:t>fit </a:t>
+            </a:r>
+            <a:r>
+              <a:rPr>
+                <a:solidFill>
+                  <a:srgbClr val="007020"/>
+                </a:solidFill>
+                <a:latin typeface="Courier"/>
+              </a:rPr>
+              <a:t>&lt;-</a:t>
+            </a:r>
+            <a:r>
+              <a:rPr>
+                <a:latin typeface="Courier"/>
+              </a:rPr>
+              <a:t> </a:t>
+            </a:r>
+            <a:r>
+              <a:rPr>
+                <a:solidFill>
+                  <a:srgbClr val="06287E"/>
+                </a:solidFill>
+                <a:latin typeface="Courier"/>
+              </a:rPr>
+              <a:t>cfa</a:t>
+            </a:r>
+            <a:r>
+              <a:rPr>
+                <a:latin typeface="Courier"/>
+              </a:rPr>
+              <a:t>(model1, </a:t>
+            </a:r>
+            <a:r>
+              <a:rPr>
+                <a:solidFill>
+                  <a:srgbClr val="7D9029"/>
+                </a:solidFill>
+                <a:latin typeface="Courier"/>
+              </a:rPr>
+              <a:t>data =</a:t>
+            </a:r>
+            <a:r>
+              <a:rPr>
+                <a:latin typeface="Courier"/>
+              </a:rPr>
+              <a:t> Raw_data_to_analyze_SEM)</a:t>
+            </a:r>
+            <a:br/>
+            <a:br/>
+            <a:br/>
+            <a:r>
+              <a:rPr i="1">
+                <a:solidFill>
+                  <a:srgbClr val="60A0B0"/>
+                </a:solidFill>
+                <a:latin typeface="Courier"/>
+              </a:rPr>
+              <a:t># Finding the fit summary</a:t>
+            </a:r>
+            <a:br/>
+            <a:br/>
+            <a:r>
+              <a:rPr>
+                <a:solidFill>
+                  <a:srgbClr val="06287E"/>
+                </a:solidFill>
+                <a:latin typeface="Courier"/>
+              </a:rPr>
+              <a:t>summary</a:t>
+            </a:r>
+            <a:r>
+              <a:rPr>
+                <a:latin typeface="Courier"/>
+              </a:rPr>
+              <a:t>(fit,</a:t>
+            </a:r>
+            <a:r>
+              <a:rPr>
+                <a:solidFill>
+                  <a:srgbClr val="7D9029"/>
+                </a:solidFill>
+                <a:latin typeface="Courier"/>
+              </a:rPr>
+              <a:t>fit.measures=</a:t>
+            </a:r>
+            <a:r>
+              <a:rPr>
+                <a:solidFill>
+                  <a:srgbClr val="880000"/>
+                </a:solidFill>
+                <a:latin typeface="Courier"/>
+              </a:rPr>
+              <a:t>TRUE</a:t>
+            </a:r>
+            <a:r>
+              <a:rPr>
+                <a:latin typeface="Courier"/>
+              </a:rPr>
+              <a:t>,</a:t>
+            </a:r>
+            <a:r>
+              <a:rPr>
+                <a:solidFill>
+                  <a:srgbClr val="7D9029"/>
+                </a:solidFill>
+                <a:latin typeface="Courier"/>
+              </a:rPr>
+              <a:t>standardized=</a:t>
+            </a:r>
+            <a:r>
+              <a:rPr>
+                <a:solidFill>
+                  <a:srgbClr val="880000"/>
+                </a:solidFill>
+                <a:latin typeface="Courier"/>
+              </a:rPr>
+              <a:t>TRUE</a:t>
+            </a:r>
+            <a:r>
+              <a:rPr>
+                <a:latin typeface="Courier"/>
+              </a:rPr>
+              <a:t>, </a:t>
+            </a:r>
+            <a:r>
+              <a:rPr>
+                <a:solidFill>
+                  <a:srgbClr val="7D9029"/>
+                </a:solidFill>
+                <a:latin typeface="Courier"/>
+              </a:rPr>
+              <a:t>rsquare=</a:t>
+            </a:r>
+            <a:r>
+              <a:rPr>
+                <a:solidFill>
+                  <a:srgbClr val="880000"/>
+                </a:solidFill>
+                <a:latin typeface="Courier"/>
+              </a:rPr>
+              <a:t>TRUE</a:t>
+            </a:r>
+            <a:r>
+              <a:rPr>
+                <a:latin typeface="Courier"/>
+              </a:rPr>
+              <a:t>)</a:t>
             </a:r>
           </a:p>
         </p:txBody>
@@ -4404,7 +6666,7 @@
             </a:pPr>
             <a:r>
               <a:rPr/>
-              <a:t>R Markdown</a:t>
+              <a:t>Preliminary Fit</a:t>
             </a:r>
           </a:p>
         </p:txBody>
@@ -4424,39 +6686,919 @@
           <a:bodyPr/>
           <a:lstStyle/>
           <a:p>
-            <a:pPr lvl="0" indent="0" marL="0">
+            <a:pPr lvl="0" indent="0">
               <a:buNone/>
             </a:pPr>
             <a:r>
-              <a:rPr/>
-              <a:t>This is an R Markdown presentation. Markdown is a simple formatting syntax for authoring HTML, PDF, and MS Word documents. For more details on using R Markdown see </a:t>
-            </a:r>
-            <a:r>
-              <a:rPr>
-                <a:hlinkClick r:id="rId2"/>
-              </a:rPr>
-              <a:t>http://rmarkdown.rstudio.com</a:t>
-            </a:r>
-            <a:r>
-              <a:rPr/>
+              <a:rPr>
+                <a:latin typeface="Courier"/>
+              </a:rPr>
+              <a:t>lavaan </a:t>
+            </a:r>
+            <a:r>
+              <a:rPr>
+                <a:solidFill>
+                  <a:srgbClr val="40A070"/>
+                </a:solidFill>
+                <a:latin typeface="Courier"/>
+              </a:rPr>
+              <a:t>0</a:t>
+            </a:r>
+            <a:r>
+              <a:rPr>
+                <a:latin typeface="Courier"/>
+              </a:rPr>
               <a:t>.</a:t>
             </a:r>
-          </a:p>
-          <a:p>
-            <a:pPr lvl="0" indent="0" marL="0">
-              <a:buNone/>
-            </a:pPr>
-            <a:r>
-              <a:rPr/>
-              <a:t>When you click the </a:t>
-            </a:r>
-            <a:r>
-              <a:rPr b="1"/>
-              <a:t>Knit</a:t>
-            </a:r>
-            <a:r>
-              <a:rPr/>
-              <a:t> button a document will be generated that includes both content as well as the output of any embedded R code chunks within the document.</a:t>
+            <a:r>
+              <a:rPr>
+                <a:solidFill>
+                  <a:srgbClr val="40A070"/>
+                </a:solidFill>
+                <a:latin typeface="Courier"/>
+              </a:rPr>
+              <a:t>6.15</a:t>
+            </a:r>
+            <a:r>
+              <a:rPr>
+                <a:latin typeface="Courier"/>
+              </a:rPr>
+              <a:t> ended normally after </a:t>
+            </a:r>
+            <a:r>
+              <a:rPr>
+                <a:solidFill>
+                  <a:srgbClr val="40A070"/>
+                </a:solidFill>
+                <a:latin typeface="Courier"/>
+              </a:rPr>
+              <a:t>105</a:t>
+            </a:r>
+            <a:r>
+              <a:rPr>
+                <a:latin typeface="Courier"/>
+              </a:rPr>
+              <a:t> iterations</a:t>
+            </a:r>
+            <a:br/>
+            <a:br/>
+            <a:r>
+              <a:rPr>
+                <a:latin typeface="Courier"/>
+              </a:rPr>
+              <a:t>  Estimator                                         ML</a:t>
+            </a:r>
+            <a:br/>
+            <a:r>
+              <a:rPr>
+                <a:latin typeface="Courier"/>
+              </a:rPr>
+              <a:t>  Optimization method                           NLMINB</a:t>
+            </a:r>
+            <a:br/>
+            <a:r>
+              <a:rPr>
+                <a:latin typeface="Courier"/>
+              </a:rPr>
+              <a:t>  Number of model parameters                       </a:t>
+            </a:r>
+            <a:r>
+              <a:rPr>
+                <a:solidFill>
+                  <a:srgbClr val="40A070"/>
+                </a:solidFill>
+                <a:latin typeface="Courier"/>
+              </a:rPr>
+              <a:t>106</a:t>
+            </a:r>
+            <a:br/>
+            <a:br/>
+            <a:r>
+              <a:rPr>
+                <a:latin typeface="Courier"/>
+              </a:rPr>
+              <a:t>  Number of observations                           </a:t>
+            </a:r>
+            <a:r>
+              <a:rPr>
+                <a:solidFill>
+                  <a:srgbClr val="40A070"/>
+                </a:solidFill>
+                <a:latin typeface="Courier"/>
+              </a:rPr>
+              <a:t>170</a:t>
+            </a:r>
+            <a:br/>
+            <a:br/>
+            <a:r>
+              <a:rPr>
+                <a:latin typeface="Courier"/>
+              </a:rPr>
+              <a:t>Model Test User Model</a:t>
+            </a:r>
+            <a:r>
+              <a:rPr>
+                <a:solidFill>
+                  <a:srgbClr val="4070A0"/>
+                </a:solidFill>
+                <a:latin typeface="Courier"/>
+              </a:rPr>
+              <a:t>:</a:t>
+            </a:r>
+            <a:br/>
+            <a:r>
+              <a:rPr>
+                <a:latin typeface="Courier"/>
+              </a:rPr>
+              <a:t>                                                      </a:t>
+            </a:r>
+            <a:br/>
+            <a:r>
+              <a:rPr>
+                <a:latin typeface="Courier"/>
+              </a:rPr>
+              <a:t>  Test statistic                              </a:t>
+            </a:r>
+            <a:r>
+              <a:rPr>
+                <a:solidFill>
+                  <a:srgbClr val="40A070"/>
+                </a:solidFill>
+                <a:latin typeface="Courier"/>
+              </a:rPr>
+              <a:t>2281.873</a:t>
+            </a:r>
+            <a:br/>
+            <a:r>
+              <a:rPr>
+                <a:latin typeface="Courier"/>
+              </a:rPr>
+              <a:t>  Degrees of freedom                               </a:t>
+            </a:r>
+            <a:r>
+              <a:rPr>
+                <a:solidFill>
+                  <a:srgbClr val="40A070"/>
+                </a:solidFill>
+                <a:latin typeface="Courier"/>
+              </a:rPr>
+              <a:t>755</a:t>
+            </a:r>
+            <a:br/>
+            <a:r>
+              <a:rPr>
+                <a:latin typeface="Courier"/>
+              </a:rPr>
+              <a:t>  P</a:t>
+            </a:r>
+            <a:r>
+              <a:rPr>
+                <a:solidFill>
+                  <a:srgbClr val="4070A0"/>
+                </a:solidFill>
+                <a:latin typeface="Courier"/>
+              </a:rPr>
+              <a:t>-</a:t>
+            </a:r>
+            <a:r>
+              <a:rPr>
+                <a:solidFill>
+                  <a:srgbClr val="06287E"/>
+                </a:solidFill>
+                <a:latin typeface="Courier"/>
+              </a:rPr>
+              <a:t>value</a:t>
+            </a:r>
+            <a:r>
+              <a:rPr>
+                <a:latin typeface="Courier"/>
+              </a:rPr>
+              <a:t> (Chi</a:t>
+            </a:r>
+            <a:r>
+              <a:rPr>
+                <a:solidFill>
+                  <a:srgbClr val="4070A0"/>
+                </a:solidFill>
+                <a:latin typeface="Courier"/>
+              </a:rPr>
+              <a:t>-</a:t>
+            </a:r>
+            <a:r>
+              <a:rPr>
+                <a:latin typeface="Courier"/>
+              </a:rPr>
+              <a:t>square)                           </a:t>
+            </a:r>
+            <a:r>
+              <a:rPr>
+                <a:solidFill>
+                  <a:srgbClr val="40A070"/>
+                </a:solidFill>
+                <a:latin typeface="Courier"/>
+              </a:rPr>
+              <a:t>0.000</a:t>
+            </a:r>
+            <a:br/>
+            <a:br/>
+            <a:r>
+              <a:rPr>
+                <a:latin typeface="Courier"/>
+              </a:rPr>
+              <a:t>Model Test Baseline Model</a:t>
+            </a:r>
+            <a:r>
+              <a:rPr>
+                <a:solidFill>
+                  <a:srgbClr val="4070A0"/>
+                </a:solidFill>
+                <a:latin typeface="Courier"/>
+              </a:rPr>
+              <a:t>:</a:t>
+            </a:r>
+            <a:br/>
+            <a:br/>
+            <a:r>
+              <a:rPr>
+                <a:latin typeface="Courier"/>
+              </a:rPr>
+              <a:t>  Test statistic                              </a:t>
+            </a:r>
+            <a:r>
+              <a:rPr>
+                <a:solidFill>
+                  <a:srgbClr val="40A070"/>
+                </a:solidFill>
+                <a:latin typeface="Courier"/>
+              </a:rPr>
+              <a:t>4906.262</a:t>
+            </a:r>
+            <a:br/>
+            <a:r>
+              <a:rPr>
+                <a:latin typeface="Courier"/>
+              </a:rPr>
+              <a:t>  Degrees of freedom                               </a:t>
+            </a:r>
+            <a:r>
+              <a:rPr>
+                <a:solidFill>
+                  <a:srgbClr val="40A070"/>
+                </a:solidFill>
+                <a:latin typeface="Courier"/>
+              </a:rPr>
+              <a:t>820</a:t>
+            </a:r>
+            <a:br/>
+            <a:r>
+              <a:rPr>
+                <a:latin typeface="Courier"/>
+              </a:rPr>
+              <a:t>  P</a:t>
+            </a:r>
+            <a:r>
+              <a:rPr>
+                <a:solidFill>
+                  <a:srgbClr val="4070A0"/>
+                </a:solidFill>
+                <a:latin typeface="Courier"/>
+              </a:rPr>
+              <a:t>-</a:t>
+            </a:r>
+            <a:r>
+              <a:rPr>
+                <a:latin typeface="Courier"/>
+              </a:rPr>
+              <a:t>value                                        </a:t>
+            </a:r>
+            <a:r>
+              <a:rPr>
+                <a:solidFill>
+                  <a:srgbClr val="40A070"/>
+                </a:solidFill>
+                <a:latin typeface="Courier"/>
+              </a:rPr>
+              <a:t>0.000</a:t>
+            </a:r>
+            <a:br/>
+            <a:br/>
+            <a:r>
+              <a:rPr>
+                <a:latin typeface="Courier"/>
+              </a:rPr>
+              <a:t>User Model versus Baseline Model</a:t>
+            </a:r>
+            <a:r>
+              <a:rPr>
+                <a:solidFill>
+                  <a:srgbClr val="4070A0"/>
+                </a:solidFill>
+                <a:latin typeface="Courier"/>
+              </a:rPr>
+              <a:t>:</a:t>
+            </a:r>
+            <a:br/>
+            <a:br/>
+            <a:r>
+              <a:rPr>
+                <a:latin typeface="Courier"/>
+              </a:rPr>
+              <a:t>  Comparative Fit </a:t>
+            </a:r>
+            <a:r>
+              <a:rPr>
+                <a:solidFill>
+                  <a:srgbClr val="06287E"/>
+                </a:solidFill>
+                <a:latin typeface="Courier"/>
+              </a:rPr>
+              <a:t>Index</a:t>
+            </a:r>
+            <a:r>
+              <a:rPr>
+                <a:latin typeface="Courier"/>
+              </a:rPr>
+              <a:t> (CFI)                    </a:t>
+            </a:r>
+            <a:r>
+              <a:rPr>
+                <a:solidFill>
+                  <a:srgbClr val="40A070"/>
+                </a:solidFill>
+                <a:latin typeface="Courier"/>
+              </a:rPr>
+              <a:t>0.626</a:t>
+            </a:r>
+            <a:br/>
+            <a:r>
+              <a:rPr>
+                <a:latin typeface="Courier"/>
+              </a:rPr>
+              <a:t>  Tucker</a:t>
+            </a:r>
+            <a:r>
+              <a:rPr>
+                <a:solidFill>
+                  <a:srgbClr val="4070A0"/>
+                </a:solidFill>
+                <a:latin typeface="Courier"/>
+              </a:rPr>
+              <a:t>-</a:t>
+            </a:r>
+            <a:r>
+              <a:rPr>
+                <a:latin typeface="Courier"/>
+              </a:rPr>
+              <a:t>Lewis </a:t>
+            </a:r>
+            <a:r>
+              <a:rPr>
+                <a:solidFill>
+                  <a:srgbClr val="06287E"/>
+                </a:solidFill>
+                <a:latin typeface="Courier"/>
+              </a:rPr>
+              <a:t>Index</a:t>
+            </a:r>
+            <a:r>
+              <a:rPr>
+                <a:latin typeface="Courier"/>
+              </a:rPr>
+              <a:t> (TLI)                       </a:t>
+            </a:r>
+            <a:r>
+              <a:rPr>
+                <a:solidFill>
+                  <a:srgbClr val="40A070"/>
+                </a:solidFill>
+                <a:latin typeface="Courier"/>
+              </a:rPr>
+              <a:t>0.594</a:t>
+            </a:r>
+            <a:br/>
+            <a:br/>
+            <a:r>
+              <a:rPr>
+                <a:latin typeface="Courier"/>
+              </a:rPr>
+              <a:t>Loglikelihood and Information Criteria</a:t>
+            </a:r>
+            <a:r>
+              <a:rPr>
+                <a:solidFill>
+                  <a:srgbClr val="4070A0"/>
+                </a:solidFill>
+                <a:latin typeface="Courier"/>
+              </a:rPr>
+              <a:t>:</a:t>
+            </a:r>
+            <a:br/>
+            <a:br/>
+            <a:r>
+              <a:rPr>
+                <a:latin typeface="Courier"/>
+              </a:rPr>
+              <a:t>  Loglikelihood user </a:t>
+            </a:r>
+            <a:r>
+              <a:rPr>
+                <a:solidFill>
+                  <a:srgbClr val="06287E"/>
+                </a:solidFill>
+                <a:latin typeface="Courier"/>
+              </a:rPr>
+              <a:t>model</a:t>
+            </a:r>
+            <a:r>
+              <a:rPr>
+                <a:latin typeface="Courier"/>
+              </a:rPr>
+              <a:t> (H0)              </a:t>
+            </a:r>
+            <a:r>
+              <a:rPr>
+                <a:solidFill>
+                  <a:srgbClr val="4070A0"/>
+                </a:solidFill>
+                <a:latin typeface="Courier"/>
+              </a:rPr>
+              <a:t>-</a:t>
+            </a:r>
+            <a:r>
+              <a:rPr>
+                <a:solidFill>
+                  <a:srgbClr val="40A070"/>
+                </a:solidFill>
+                <a:latin typeface="Courier"/>
+              </a:rPr>
+              <a:t>8055.643</a:t>
+            </a:r>
+            <a:br/>
+            <a:r>
+              <a:rPr>
+                <a:latin typeface="Courier"/>
+              </a:rPr>
+              <a:t>  Loglikelihood unrestricted </a:t>
+            </a:r>
+            <a:r>
+              <a:rPr>
+                <a:solidFill>
+                  <a:srgbClr val="06287E"/>
+                </a:solidFill>
+                <a:latin typeface="Courier"/>
+              </a:rPr>
+              <a:t>model</a:t>
+            </a:r>
+            <a:r>
+              <a:rPr>
+                <a:latin typeface="Courier"/>
+              </a:rPr>
+              <a:t> (H1)      </a:t>
+            </a:r>
+            <a:r>
+              <a:rPr>
+                <a:solidFill>
+                  <a:srgbClr val="4070A0"/>
+                </a:solidFill>
+                <a:latin typeface="Courier"/>
+              </a:rPr>
+              <a:t>-</a:t>
+            </a:r>
+            <a:r>
+              <a:rPr>
+                <a:solidFill>
+                  <a:srgbClr val="40A070"/>
+                </a:solidFill>
+                <a:latin typeface="Courier"/>
+              </a:rPr>
+              <a:t>6914.707</a:t>
+            </a:r>
+            <a:br/>
+            <a:r>
+              <a:rPr>
+                <a:latin typeface="Courier"/>
+              </a:rPr>
+              <a:t>                                                      </a:t>
+            </a:r>
+            <a:br/>
+            <a:r>
+              <a:rPr>
+                <a:latin typeface="Courier"/>
+              </a:rPr>
+              <a:t>  </a:t>
+            </a:r>
+            <a:r>
+              <a:rPr>
+                <a:solidFill>
+                  <a:srgbClr val="06287E"/>
+                </a:solidFill>
+                <a:latin typeface="Courier"/>
+              </a:rPr>
+              <a:t>Akaike</a:t>
+            </a:r>
+            <a:r>
+              <a:rPr>
+                <a:latin typeface="Courier"/>
+              </a:rPr>
+              <a:t> (AIC)                               </a:t>
+            </a:r>
+            <a:r>
+              <a:rPr>
+                <a:solidFill>
+                  <a:srgbClr val="40A070"/>
+                </a:solidFill>
+                <a:latin typeface="Courier"/>
+              </a:rPr>
+              <a:t>16323.287</a:t>
+            </a:r>
+            <a:br/>
+            <a:r>
+              <a:rPr>
+                <a:latin typeface="Courier"/>
+              </a:rPr>
+              <a:t>  </a:t>
+            </a:r>
+            <a:r>
+              <a:rPr>
+                <a:solidFill>
+                  <a:srgbClr val="06287E"/>
+                </a:solidFill>
+                <a:latin typeface="Courier"/>
+              </a:rPr>
+              <a:t>Bayesian</a:t>
+            </a:r>
+            <a:r>
+              <a:rPr>
+                <a:latin typeface="Courier"/>
+              </a:rPr>
+              <a:t> (BIC)                             </a:t>
+            </a:r>
+            <a:r>
+              <a:rPr>
+                <a:solidFill>
+                  <a:srgbClr val="40A070"/>
+                </a:solidFill>
+                <a:latin typeface="Courier"/>
+              </a:rPr>
+              <a:t>16655.682</a:t>
+            </a:r>
+            <a:br/>
+            <a:r>
+              <a:rPr>
+                <a:latin typeface="Courier"/>
+              </a:rPr>
+              <a:t>  Sample</a:t>
+            </a:r>
+            <a:r>
+              <a:rPr>
+                <a:solidFill>
+                  <a:srgbClr val="4070A0"/>
+                </a:solidFill>
+                <a:latin typeface="Courier"/>
+              </a:rPr>
+              <a:t>-</a:t>
+            </a:r>
+            <a:r>
+              <a:rPr>
+                <a:latin typeface="Courier"/>
+              </a:rPr>
+              <a:t>size adjusted </a:t>
+            </a:r>
+            <a:r>
+              <a:rPr>
+                <a:solidFill>
+                  <a:srgbClr val="06287E"/>
+                </a:solidFill>
+                <a:latin typeface="Courier"/>
+              </a:rPr>
+              <a:t>Bayesian</a:t>
+            </a:r>
+            <a:r>
+              <a:rPr>
+                <a:latin typeface="Courier"/>
+              </a:rPr>
+              <a:t> (SABIC)      </a:t>
+            </a:r>
+            <a:r>
+              <a:rPr>
+                <a:solidFill>
+                  <a:srgbClr val="40A070"/>
+                </a:solidFill>
+                <a:latin typeface="Courier"/>
+              </a:rPr>
+              <a:t>16320.048</a:t>
+            </a:r>
+            <a:br/>
+            <a:br/>
+            <a:r>
+              <a:rPr>
+                <a:latin typeface="Courier"/>
+              </a:rPr>
+              <a:t>Root Mean Square Error of Approximation</a:t>
+            </a:r>
+            <a:r>
+              <a:rPr>
+                <a:solidFill>
+                  <a:srgbClr val="4070A0"/>
+                </a:solidFill>
+                <a:latin typeface="Courier"/>
+              </a:rPr>
+              <a:t>:</a:t>
+            </a:r>
+            <a:br/>
+            <a:br/>
+            <a:r>
+              <a:rPr>
+                <a:latin typeface="Courier"/>
+              </a:rPr>
+              <a:t>  RMSEA                                          </a:t>
+            </a:r>
+            <a:r>
+              <a:rPr>
+                <a:solidFill>
+                  <a:srgbClr val="40A070"/>
+                </a:solidFill>
+                <a:latin typeface="Courier"/>
+              </a:rPr>
+              <a:t>0.109</a:t>
+            </a:r>
+            <a:br/>
+            <a:r>
+              <a:rPr>
+                <a:latin typeface="Courier"/>
+              </a:rPr>
+              <a:t>  </a:t>
+            </a:r>
+            <a:r>
+              <a:rPr>
+                <a:solidFill>
+                  <a:srgbClr val="40A070"/>
+                </a:solidFill>
+                <a:latin typeface="Courier"/>
+              </a:rPr>
+              <a:t>90</a:t>
+            </a:r>
+            <a:r>
+              <a:rPr>
+                <a:latin typeface="Courier"/>
+              </a:rPr>
+              <a:t> Percent confidence interval </a:t>
+            </a:r>
+            <a:r>
+              <a:rPr>
+                <a:solidFill>
+                  <a:srgbClr val="4070A0"/>
+                </a:solidFill>
+                <a:latin typeface="Courier"/>
+              </a:rPr>
+              <a:t>-</a:t>
+            </a:r>
+            <a:r>
+              <a:rPr>
+                <a:latin typeface="Courier"/>
+              </a:rPr>
+              <a:t> lower         </a:t>
+            </a:r>
+            <a:r>
+              <a:rPr>
+                <a:solidFill>
+                  <a:srgbClr val="40A070"/>
+                </a:solidFill>
+                <a:latin typeface="Courier"/>
+              </a:rPr>
+              <a:t>0.104</a:t>
+            </a:r>
+            <a:br/>
+            <a:r>
+              <a:rPr>
+                <a:latin typeface="Courier"/>
+              </a:rPr>
+              <a:t>  </a:t>
+            </a:r>
+            <a:r>
+              <a:rPr>
+                <a:solidFill>
+                  <a:srgbClr val="40A070"/>
+                </a:solidFill>
+                <a:latin typeface="Courier"/>
+              </a:rPr>
+              <a:t>90</a:t>
+            </a:r>
+            <a:r>
+              <a:rPr>
+                <a:latin typeface="Courier"/>
+              </a:rPr>
+              <a:t> Percent confidence interval </a:t>
+            </a:r>
+            <a:r>
+              <a:rPr>
+                <a:solidFill>
+                  <a:srgbClr val="4070A0"/>
+                </a:solidFill>
+                <a:latin typeface="Courier"/>
+              </a:rPr>
+              <a:t>-</a:t>
+            </a:r>
+            <a:r>
+              <a:rPr>
+                <a:latin typeface="Courier"/>
+              </a:rPr>
+              <a:t> upper         </a:t>
+            </a:r>
+            <a:r>
+              <a:rPr>
+                <a:solidFill>
+                  <a:srgbClr val="40A070"/>
+                </a:solidFill>
+                <a:latin typeface="Courier"/>
+              </a:rPr>
+              <a:t>0.114</a:t>
+            </a:r>
+            <a:br/>
+            <a:r>
+              <a:rPr>
+                <a:latin typeface="Courier"/>
+              </a:rPr>
+              <a:t>  P</a:t>
+            </a:r>
+            <a:r>
+              <a:rPr>
+                <a:solidFill>
+                  <a:srgbClr val="4070A0"/>
+                </a:solidFill>
+                <a:latin typeface="Courier"/>
+              </a:rPr>
+              <a:t>-</a:t>
+            </a:r>
+            <a:r>
+              <a:rPr>
+                <a:latin typeface="Courier"/>
+              </a:rPr>
+              <a:t>value H_0</a:t>
+            </a:r>
+            <a:r>
+              <a:rPr>
+                <a:solidFill>
+                  <a:srgbClr val="4070A0"/>
+                </a:solidFill>
+                <a:latin typeface="Courier"/>
+              </a:rPr>
+              <a:t>:</a:t>
+            </a:r>
+            <a:r>
+              <a:rPr>
+                <a:latin typeface="Courier"/>
+              </a:rPr>
+              <a:t> RMSEA </a:t>
+            </a:r>
+            <a:r>
+              <a:rPr>
+                <a:solidFill>
+                  <a:srgbClr val="4070A0"/>
+                </a:solidFill>
+                <a:latin typeface="Courier"/>
+              </a:rPr>
+              <a:t>&lt;=</a:t>
+            </a:r>
+            <a:r>
+              <a:rPr>
+                <a:latin typeface="Courier"/>
+              </a:rPr>
+              <a:t> </a:t>
+            </a:r>
+            <a:r>
+              <a:rPr>
+                <a:solidFill>
+                  <a:srgbClr val="40A070"/>
+                </a:solidFill>
+                <a:latin typeface="Courier"/>
+              </a:rPr>
+              <a:t>0.050</a:t>
+            </a:r>
+            <a:r>
+              <a:rPr>
+                <a:latin typeface="Courier"/>
+              </a:rPr>
+              <a:t>                    </a:t>
+            </a:r>
+            <a:r>
+              <a:rPr>
+                <a:solidFill>
+                  <a:srgbClr val="40A070"/>
+                </a:solidFill>
+                <a:latin typeface="Courier"/>
+              </a:rPr>
+              <a:t>0.000</a:t>
+            </a:r>
+            <a:br/>
+            <a:r>
+              <a:rPr>
+                <a:latin typeface="Courier"/>
+              </a:rPr>
+              <a:t>  P</a:t>
+            </a:r>
+            <a:r>
+              <a:rPr>
+                <a:solidFill>
+                  <a:srgbClr val="4070A0"/>
+                </a:solidFill>
+                <a:latin typeface="Courier"/>
+              </a:rPr>
+              <a:t>-</a:t>
+            </a:r>
+            <a:r>
+              <a:rPr>
+                <a:latin typeface="Courier"/>
+              </a:rPr>
+              <a:t>value H_0</a:t>
+            </a:r>
+            <a:r>
+              <a:rPr>
+                <a:solidFill>
+                  <a:srgbClr val="4070A0"/>
+                </a:solidFill>
+                <a:latin typeface="Courier"/>
+              </a:rPr>
+              <a:t>:</a:t>
+            </a:r>
+            <a:r>
+              <a:rPr>
+                <a:latin typeface="Courier"/>
+              </a:rPr>
+              <a:t> RMSEA </a:t>
+            </a:r>
+            <a:r>
+              <a:rPr>
+                <a:solidFill>
+                  <a:srgbClr val="4070A0"/>
+                </a:solidFill>
+                <a:latin typeface="Courier"/>
+              </a:rPr>
+              <a:t>&gt;=</a:t>
+            </a:r>
+            <a:r>
+              <a:rPr>
+                <a:latin typeface="Courier"/>
+              </a:rPr>
+              <a:t> </a:t>
+            </a:r>
+            <a:r>
+              <a:rPr>
+                <a:solidFill>
+                  <a:srgbClr val="40A070"/>
+                </a:solidFill>
+                <a:latin typeface="Courier"/>
+              </a:rPr>
+              <a:t>0.080</a:t>
+            </a:r>
+            <a:r>
+              <a:rPr>
+                <a:latin typeface="Courier"/>
+              </a:rPr>
+              <a:t>                    </a:t>
+            </a:r>
+            <a:r>
+              <a:rPr>
+                <a:solidFill>
+                  <a:srgbClr val="40A070"/>
+                </a:solidFill>
+                <a:latin typeface="Courier"/>
+              </a:rPr>
+              <a:t>1.000</a:t>
+            </a:r>
+            <a:br/>
+            <a:br/>
+            <a:r>
+              <a:rPr>
+                <a:latin typeface="Courier"/>
+              </a:rPr>
+              <a:t>Standardized Root Mean Square Residual</a:t>
+            </a:r>
+            <a:r>
+              <a:rPr>
+                <a:solidFill>
+                  <a:srgbClr val="4070A0"/>
+                </a:solidFill>
+                <a:latin typeface="Courier"/>
+              </a:rPr>
+              <a:t>:</a:t>
+            </a:r>
+            <a:br/>
+            <a:br/>
+            <a:r>
+              <a:rPr>
+                <a:latin typeface="Courier"/>
+              </a:rPr>
+              <a:t>  SRMR                                           </a:t>
+            </a:r>
+            <a:r>
+              <a:rPr>
+                <a:solidFill>
+                  <a:srgbClr val="40A070"/>
+                </a:solidFill>
+                <a:latin typeface="Courier"/>
+              </a:rPr>
+              <a:t>0.125</a:t>
             </a:r>
           </a:p>
         </p:txBody>

</xml_diff>